<commit_message>
Update Assignment 2 Portfolio.pptx
</commit_message>
<xml_diff>
--- a/Assignment 2 Portfolio.pptx
+++ b/Assignment 2 Portfolio.pptx
@@ -17,17 +17,18 @@
     <p:sldId id="267" r:id="rId11"/>
     <p:sldId id="277" r:id="rId12"/>
     <p:sldId id="276" r:id="rId13"/>
-    <p:sldId id="259" r:id="rId14"/>
-    <p:sldId id="278" r:id="rId15"/>
-    <p:sldId id="260" r:id="rId16"/>
-    <p:sldId id="269" r:id="rId17"/>
-    <p:sldId id="270" r:id="rId18"/>
-    <p:sldId id="271" r:id="rId19"/>
-    <p:sldId id="272" r:id="rId20"/>
-    <p:sldId id="273" r:id="rId21"/>
-    <p:sldId id="274" r:id="rId22"/>
-    <p:sldId id="275" r:id="rId23"/>
-    <p:sldId id="261" r:id="rId24"/>
+    <p:sldId id="278" r:id="rId14"/>
+    <p:sldId id="282" r:id="rId15"/>
+    <p:sldId id="259" r:id="rId16"/>
+    <p:sldId id="260" r:id="rId17"/>
+    <p:sldId id="269" r:id="rId18"/>
+    <p:sldId id="270" r:id="rId19"/>
+    <p:sldId id="271" r:id="rId20"/>
+    <p:sldId id="272" r:id="rId21"/>
+    <p:sldId id="273" r:id="rId22"/>
+    <p:sldId id="274" r:id="rId23"/>
+    <p:sldId id="275" r:id="rId24"/>
+    <p:sldId id="261" r:id="rId25"/>
   </p:sldIdLst>
   <p:sldSz cx="12192000" cy="6858000"/>
   <p:notesSz cx="6858000" cy="9144000"/>
@@ -132,6 +133,228 @@
     </p:ext>
   </p:extLst>
 </p:presentation>
+</file>
+
+<file path=ppt/revisionInfo.xml><?xml version="1.0" encoding="utf-8"?>
+<p1510:revInfo xmlns:a="http://schemas.openxmlformats.org/drawingml/2006/main" xmlns:r="http://schemas.openxmlformats.org/officeDocument/2006/relationships" xmlns:p1510="http://schemas.microsoft.com/office/powerpoint/2015/10/main">
+  <p1510:revLst>
+    <p1510:client id="{BC9E4171-0697-468A-ABC8-3C271CD6997E}" v="56" dt="2024-09-22T12:51:51.578"/>
+  </p1510:revLst>
+</p1510:revInfo>
+</file>
+
+<file path=ppt/changesInfos/changesInfo1.xml><?xml version="1.0" encoding="utf-8"?>
+<pc:chgInfo xmlns:a="http://schemas.openxmlformats.org/drawingml/2006/main" xmlns:r="http://schemas.openxmlformats.org/officeDocument/2006/relationships" xmlns:ac="http://schemas.microsoft.com/office/drawing/2013/main/command" xmlns:pc="http://schemas.microsoft.com/office/powerpoint/2013/main/command">
+  <pc:docChgLst>
+    <pc:chgData name="Daniel Edwards" userId="48061a190aefe317" providerId="LiveId" clId="{BC9E4171-0697-468A-ABC8-3C271CD6997E}"/>
+    <pc:docChg chg="undo redo custSel addSld delSld modSld sldOrd">
+      <pc:chgData name="Daniel Edwards" userId="48061a190aefe317" providerId="LiveId" clId="{BC9E4171-0697-468A-ABC8-3C271CD6997E}" dt="2024-09-22T12:54:10.454" v="744" actId="2165"/>
+      <pc:docMkLst>
+        <pc:docMk/>
+      </pc:docMkLst>
+      <pc:sldChg chg="addSp delSp modSp mod ord">
+        <pc:chgData name="Daniel Edwards" userId="48061a190aefe317" providerId="LiveId" clId="{BC9E4171-0697-468A-ABC8-3C271CD6997E}" dt="2024-09-22T12:54:04.210" v="742" actId="1076"/>
+        <pc:sldMkLst>
+          <pc:docMk/>
+          <pc:sldMk cId="1084008793" sldId="259"/>
+        </pc:sldMkLst>
+        <pc:spChg chg="mod">
+          <ac:chgData name="Daniel Edwards" userId="48061a190aefe317" providerId="LiveId" clId="{BC9E4171-0697-468A-ABC8-3C271CD6997E}" dt="2024-09-22T12:43:28.703" v="686" actId="20577"/>
+          <ac:spMkLst>
+            <pc:docMk/>
+            <pc:sldMk cId="1084008793" sldId="259"/>
+            <ac:spMk id="3" creationId="{708665FA-0DCC-8B49-151A-1B045CC893F8}"/>
+          </ac:spMkLst>
+        </pc:spChg>
+        <pc:spChg chg="add mod">
+          <ac:chgData name="Daniel Edwards" userId="48061a190aefe317" providerId="LiveId" clId="{BC9E4171-0697-468A-ABC8-3C271CD6997E}" dt="2024-09-22T12:54:04.210" v="742" actId="1076"/>
+          <ac:spMkLst>
+            <pc:docMk/>
+            <pc:sldMk cId="1084008793" sldId="259"/>
+            <ac:spMk id="4" creationId="{F8FBC88C-32A6-F142-C3DB-8589D7DBCDA2}"/>
+          </ac:spMkLst>
+        </pc:spChg>
+        <pc:picChg chg="del">
+          <ac:chgData name="Daniel Edwards" userId="48061a190aefe317" providerId="LiveId" clId="{BC9E4171-0697-468A-ABC8-3C271CD6997E}" dt="2024-09-22T12:51:50.935" v="717" actId="478"/>
+          <ac:picMkLst>
+            <pc:docMk/>
+            <pc:sldMk cId="1084008793" sldId="259"/>
+            <ac:picMk id="6" creationId="{36E78D41-BBA9-AF76-6B20-182E6D29AD2B}"/>
+          </ac:picMkLst>
+        </pc:picChg>
+      </pc:sldChg>
+      <pc:sldChg chg="modSp mod">
+        <pc:chgData name="Daniel Edwards" userId="48061a190aefe317" providerId="LiveId" clId="{BC9E4171-0697-468A-ABC8-3C271CD6997E}" dt="2024-09-22T11:52:25.563" v="35"/>
+        <pc:sldMkLst>
+          <pc:docMk/>
+          <pc:sldMk cId="3196578592" sldId="261"/>
+        </pc:sldMkLst>
+        <pc:spChg chg="mod">
+          <ac:chgData name="Daniel Edwards" userId="48061a190aefe317" providerId="LiveId" clId="{BC9E4171-0697-468A-ABC8-3C271CD6997E}" dt="2024-09-22T11:52:25.563" v="35"/>
+          <ac:spMkLst>
+            <pc:docMk/>
+            <pc:sldMk cId="3196578592" sldId="261"/>
+            <ac:spMk id="3" creationId="{1F35B3E9-74CB-5580-6217-E60660C29E4C}"/>
+          </ac:spMkLst>
+        </pc:spChg>
+      </pc:sldChg>
+      <pc:sldChg chg="modSp mod">
+        <pc:chgData name="Daniel Edwards" userId="48061a190aefe317" providerId="LiveId" clId="{BC9E4171-0697-468A-ABC8-3C271CD6997E}" dt="2024-09-22T12:25:33.458" v="370"/>
+        <pc:sldMkLst>
+          <pc:docMk/>
+          <pc:sldMk cId="102733115" sldId="275"/>
+        </pc:sldMkLst>
+        <pc:spChg chg="mod">
+          <ac:chgData name="Daniel Edwards" userId="48061a190aefe317" providerId="LiveId" clId="{BC9E4171-0697-468A-ABC8-3C271CD6997E}" dt="2024-09-22T12:25:33.458" v="370"/>
+          <ac:spMkLst>
+            <pc:docMk/>
+            <pc:sldMk cId="102733115" sldId="275"/>
+            <ac:spMk id="3" creationId="{47AD6304-6EE4-C018-BDE9-B77CF89EB551}"/>
+          </ac:spMkLst>
+        </pc:spChg>
+      </pc:sldChg>
+      <pc:sldChg chg="modSp">
+        <pc:chgData name="Daniel Edwards" userId="48061a190aefe317" providerId="LiveId" clId="{BC9E4171-0697-468A-ABC8-3C271CD6997E}" dt="2024-09-22T11:56:06.686" v="46" actId="20577"/>
+        <pc:sldMkLst>
+          <pc:docMk/>
+          <pc:sldMk cId="2679302679" sldId="278"/>
+        </pc:sldMkLst>
+        <pc:graphicFrameChg chg="mod">
+          <ac:chgData name="Daniel Edwards" userId="48061a190aefe317" providerId="LiveId" clId="{BC9E4171-0697-468A-ABC8-3C271CD6997E}" dt="2024-09-22T11:56:06.686" v="46" actId="20577"/>
+          <ac:graphicFrameMkLst>
+            <pc:docMk/>
+            <pc:sldMk cId="2679302679" sldId="278"/>
+            <ac:graphicFrameMk id="29" creationId="{AF8424D4-9545-EC29-CED9-9C575DF7A055}"/>
+          </ac:graphicFrameMkLst>
+        </pc:graphicFrameChg>
+      </pc:sldChg>
+      <pc:sldChg chg="addSp delSp modSp new del mod">
+        <pc:chgData name="Daniel Edwards" userId="48061a190aefe317" providerId="LiveId" clId="{BC9E4171-0697-468A-ABC8-3C271CD6997E}" dt="2024-09-22T12:12:27.851" v="313" actId="47"/>
+        <pc:sldMkLst>
+          <pc:docMk/>
+          <pc:sldMk cId="3028426719" sldId="279"/>
+        </pc:sldMkLst>
+        <pc:spChg chg="mod">
+          <ac:chgData name="Daniel Edwards" userId="48061a190aefe317" providerId="LiveId" clId="{BC9E4171-0697-468A-ABC8-3C271CD6997E}" dt="2024-09-22T12:10:18.641" v="259" actId="20577"/>
+          <ac:spMkLst>
+            <pc:docMk/>
+            <pc:sldMk cId="3028426719" sldId="279"/>
+            <ac:spMk id="2" creationId="{4D3350CB-42A5-93AB-48C7-8446AE9CBAE5}"/>
+          </ac:spMkLst>
+        </pc:spChg>
+        <pc:spChg chg="del">
+          <ac:chgData name="Daniel Edwards" userId="48061a190aefe317" providerId="LiveId" clId="{BC9E4171-0697-468A-ABC8-3C271CD6997E}" dt="2024-09-22T11:56:51.943" v="52" actId="3680"/>
+          <ac:spMkLst>
+            <pc:docMk/>
+            <pc:sldMk cId="3028426719" sldId="279"/>
+            <ac:spMk id="3" creationId="{D94BE175-10F2-6AD7-6633-A45E7C731F1B}"/>
+          </ac:spMkLst>
+        </pc:spChg>
+        <pc:graphicFrameChg chg="add mod ord modGraphic">
+          <ac:chgData name="Daniel Edwards" userId="48061a190aefe317" providerId="LiveId" clId="{BC9E4171-0697-468A-ABC8-3C271CD6997E}" dt="2024-09-22T12:10:40.629" v="262" actId="1076"/>
+          <ac:graphicFrameMkLst>
+            <pc:docMk/>
+            <pc:sldMk cId="3028426719" sldId="279"/>
+            <ac:graphicFrameMk id="4" creationId="{B0F06745-2E77-3A77-8ADA-B36FD55D029F}"/>
+          </ac:graphicFrameMkLst>
+        </pc:graphicFrameChg>
+      </pc:sldChg>
+      <pc:sldChg chg="addSp delSp modSp new del mod">
+        <pc:chgData name="Daniel Edwards" userId="48061a190aefe317" providerId="LiveId" clId="{BC9E4171-0697-468A-ABC8-3C271CD6997E}" dt="2024-09-22T12:11:28.981" v="280" actId="47"/>
+        <pc:sldMkLst>
+          <pc:docMk/>
+          <pc:sldMk cId="2913588233" sldId="280"/>
+        </pc:sldMkLst>
+        <pc:spChg chg="mod">
+          <ac:chgData name="Daniel Edwards" userId="48061a190aefe317" providerId="LiveId" clId="{BC9E4171-0697-468A-ABC8-3C271CD6997E}" dt="2024-09-22T11:56:02.290" v="45" actId="27636"/>
+          <ac:spMkLst>
+            <pc:docMk/>
+            <pc:sldMk cId="2913588233" sldId="280"/>
+            <ac:spMk id="2" creationId="{3F2C22FD-A4C7-42EE-FB6A-8A5C1B6651D2}"/>
+          </ac:spMkLst>
+        </pc:spChg>
+        <pc:spChg chg="add del">
+          <ac:chgData name="Daniel Edwards" userId="48061a190aefe317" providerId="LiveId" clId="{BC9E4171-0697-468A-ABC8-3C271CD6997E}" dt="2024-09-22T11:57:11.310" v="92" actId="22"/>
+          <ac:spMkLst>
+            <pc:docMk/>
+            <pc:sldMk cId="2913588233" sldId="280"/>
+            <ac:spMk id="5" creationId="{ED3B183E-D478-6456-B410-CA9CE9CCCD0A}"/>
+          </ac:spMkLst>
+        </pc:spChg>
+        <pc:graphicFrameChg chg="add mod modGraphic">
+          <ac:chgData name="Daniel Edwards" userId="48061a190aefe317" providerId="LiveId" clId="{BC9E4171-0697-468A-ABC8-3C271CD6997E}" dt="2024-09-22T12:00:24.924" v="98" actId="20577"/>
+          <ac:graphicFrameMkLst>
+            <pc:docMk/>
+            <pc:sldMk cId="2913588233" sldId="280"/>
+            <ac:graphicFrameMk id="6" creationId="{778AA2F1-E94F-A22E-ABE4-D0C7F79653D9}"/>
+          </ac:graphicFrameMkLst>
+        </pc:graphicFrameChg>
+      </pc:sldChg>
+      <pc:sldChg chg="addSp modSp new del mod">
+        <pc:chgData name="Daniel Edwards" userId="48061a190aefe317" providerId="LiveId" clId="{BC9E4171-0697-468A-ABC8-3C271CD6997E}" dt="2024-09-22T12:11:28.205" v="279" actId="47"/>
+        <pc:sldMkLst>
+          <pc:docMk/>
+          <pc:sldMk cId="1761248610" sldId="281"/>
+        </pc:sldMkLst>
+        <pc:spChg chg="mod">
+          <ac:chgData name="Daniel Edwards" userId="48061a190aefe317" providerId="LiveId" clId="{BC9E4171-0697-468A-ABC8-3C271CD6997E}" dt="2024-09-22T12:11:16.460" v="274" actId="20577"/>
+          <ac:spMkLst>
+            <pc:docMk/>
+            <pc:sldMk cId="1761248610" sldId="281"/>
+            <ac:spMk id="2" creationId="{BB3F5FE7-BDEA-1A79-7E72-6BA75436BB76}"/>
+          </ac:spMkLst>
+        </pc:spChg>
+        <pc:graphicFrameChg chg="add mod modGraphic">
+          <ac:chgData name="Daniel Edwards" userId="48061a190aefe317" providerId="LiveId" clId="{BC9E4171-0697-468A-ABC8-3C271CD6997E}" dt="2024-09-22T12:00:27.001" v="100" actId="20577"/>
+          <ac:graphicFrameMkLst>
+            <pc:docMk/>
+            <pc:sldMk cId="1761248610" sldId="281"/>
+            <ac:graphicFrameMk id="4" creationId="{E147775C-7730-646E-260A-82E07DA0F6DC}"/>
+          </ac:graphicFrameMkLst>
+        </pc:graphicFrameChg>
+      </pc:sldChg>
+      <pc:sldChg chg="addSp delSp modSp new mod">
+        <pc:chgData name="Daniel Edwards" userId="48061a190aefe317" providerId="LiveId" clId="{BC9E4171-0697-468A-ABC8-3C271CD6997E}" dt="2024-09-22T12:54:10.454" v="744" actId="2165"/>
+        <pc:sldMkLst>
+          <pc:docMk/>
+          <pc:sldMk cId="2030101805" sldId="282"/>
+        </pc:sldMkLst>
+        <pc:spChg chg="mod">
+          <ac:chgData name="Daniel Edwards" userId="48061a190aefe317" providerId="LiveId" clId="{BC9E4171-0697-468A-ABC8-3C271CD6997E}" dt="2024-09-22T12:10:59.916" v="270"/>
+          <ac:spMkLst>
+            <pc:docMk/>
+            <pc:sldMk cId="2030101805" sldId="282"/>
+            <ac:spMk id="2" creationId="{59993CE2-90C9-4015-48FA-1924B6F132DB}"/>
+          </ac:spMkLst>
+        </pc:spChg>
+        <pc:spChg chg="mod">
+          <ac:chgData name="Daniel Edwards" userId="48061a190aefe317" providerId="LiveId" clId="{BC9E4171-0697-468A-ABC8-3C271CD6997E}" dt="2024-09-22T12:13:37.656" v="365" actId="1076"/>
+          <ac:spMkLst>
+            <pc:docMk/>
+            <pc:sldMk cId="2030101805" sldId="282"/>
+            <ac:spMk id="3" creationId="{25724BE3-079D-3BC8-92A9-1E52E9CE0D60}"/>
+          </ac:spMkLst>
+        </pc:spChg>
+        <pc:spChg chg="add del mod">
+          <ac:chgData name="Daniel Edwards" userId="48061a190aefe317" providerId="LiveId" clId="{BC9E4171-0697-468A-ABC8-3C271CD6997E}" dt="2024-09-22T12:54:04.843" v="743" actId="478"/>
+          <ac:spMkLst>
+            <pc:docMk/>
+            <pc:sldMk cId="2030101805" sldId="282"/>
+            <ac:spMk id="5" creationId="{C5C70443-8D8E-5E73-9B1B-001CB90A916D}"/>
+          </ac:spMkLst>
+        </pc:spChg>
+        <pc:graphicFrameChg chg="add mod modGraphic">
+          <ac:chgData name="Daniel Edwards" userId="48061a190aefe317" providerId="LiveId" clId="{BC9E4171-0697-468A-ABC8-3C271CD6997E}" dt="2024-09-22T12:54:10.454" v="744" actId="2165"/>
+          <ac:graphicFrameMkLst>
+            <pc:docMk/>
+            <pc:sldMk cId="2030101805" sldId="282"/>
+            <ac:graphicFrameMk id="4" creationId="{DB03D4D1-ECA8-CF05-6233-EBF480BD0E5F}"/>
+          </ac:graphicFrameMkLst>
+        </pc:graphicFrameChg>
+      </pc:sldChg>
+    </pc:docChg>
+  </pc:docChgLst>
+</pc:chgInfo>
 </file>
 
 <file path=ppt/diagrams/colors1.xml><?xml version="1.0" encoding="utf-8"?>
@@ -2276,7 +2499,7 @@
         <a:p>
           <a:r>
             <a:rPr lang="en-AU" dirty="0"/>
-            <a:t>CVE-2023-36934.</a:t>
+            <a:t>CVE-2023-36934</a:t>
           </a:r>
           <a:endParaRPr lang="en-US" dirty="0"/>
         </a:p>
@@ -3053,7 +3276,7 @@
           </a:pPr>
           <a:r>
             <a:rPr lang="en-AU" sz="3000" kern="1200" dirty="0"/>
-            <a:t>CVE-2023-36934.</a:t>
+            <a:t>CVE-2023-36934</a:t>
           </a:r>
           <a:endParaRPr lang="en-US" sz="3000" kern="1200" dirty="0"/>
         </a:p>
@@ -6041,7 +6264,7 @@
             <a:fld id="{11A6662E-FAF4-44BC-88B5-85A7CBFB6D30}" type="datetime1">
               <a:rPr lang="en-US" smtClean="0"/>
               <a:pPr/>
-              <a:t>9/18/2024</a:t>
+              <a:t>9/22/2024</a:t>
             </a:fld>
             <a:endParaRPr lang="en-US"/>
           </a:p>
@@ -6252,7 +6475,7 @@
           <a:p>
             <a:fld id="{4C559632-1575-4E14-B53B-3DC3D5ED3947}" type="datetime1">
               <a:rPr lang="en-US" smtClean="0"/>
-              <a:t>9/18/2024</a:t>
+              <a:t>9/22/2024</a:t>
             </a:fld>
             <a:endParaRPr lang="en-US"/>
           </a:p>
@@ -6460,7 +6683,7 @@
           <a:p>
             <a:fld id="{CC4A6868-2568-4CC9-B302-F37117B01A6E}" type="datetime1">
               <a:rPr lang="en-US" smtClean="0"/>
-              <a:t>9/18/2024</a:t>
+              <a:t>9/22/2024</a:t>
             </a:fld>
             <a:endParaRPr lang="en-US"/>
           </a:p>
@@ -6663,7 +6886,7 @@
           <a:p>
             <a:fld id="{0055F08A-1E71-4B2B-BB49-E743F2903911}" type="datetime1">
               <a:rPr lang="en-US" smtClean="0"/>
-              <a:t>9/18/2024</a:t>
+              <a:t>9/22/2024</a:t>
             </a:fld>
             <a:endParaRPr lang="en-US" dirty="0"/>
           </a:p>
@@ -6937,7 +7160,7 @@
           <a:p>
             <a:fld id="{15417D9E-721A-44BB-8863-9873FE64DA75}" type="datetime1">
               <a:rPr lang="en-US" smtClean="0"/>
-              <a:t>9/18/2024</a:t>
+              <a:t>9/22/2024</a:t>
             </a:fld>
             <a:endParaRPr lang="en-US"/>
           </a:p>
@@ -7207,7 +7430,7 @@
           <a:p>
             <a:fld id="{5F31DA2F-80B8-49CF-99FB-5ABCA53A607A}" type="datetime1">
               <a:rPr lang="en-US" smtClean="0"/>
-              <a:t>9/18/2024</a:t>
+              <a:t>9/22/2024</a:t>
             </a:fld>
             <a:endParaRPr lang="en-US"/>
           </a:p>
@@ -7620,7 +7843,7 @@
           <a:p>
             <a:fld id="{28852172-E6C9-4B6C-929A-A9DE3837BBF1}" type="datetime1">
               <a:rPr lang="en-US" smtClean="0"/>
-              <a:t>9/18/2024</a:t>
+              <a:t>9/22/2024</a:t>
             </a:fld>
             <a:endParaRPr lang="en-US"/>
           </a:p>
@@ -7766,7 +7989,7 @@
           <a:p>
             <a:fld id="{3AB41CFF-90C9-47B3-9DA1-F2BF8D839F7E}" type="datetime1">
               <a:rPr lang="en-US" smtClean="0"/>
-              <a:t>9/18/2024</a:t>
+              <a:t>9/22/2024</a:t>
             </a:fld>
             <a:endParaRPr lang="en-US"/>
           </a:p>
@@ -7879,7 +8102,7 @@
           <a:p>
             <a:fld id="{F06048FA-06AB-4884-A69B-986B96E68A24}" type="datetime1">
               <a:rPr lang="en-US" smtClean="0"/>
-              <a:t>9/18/2024</a:t>
+              <a:t>9/22/2024</a:t>
             </a:fld>
             <a:endParaRPr lang="en-US"/>
           </a:p>
@@ -8190,7 +8413,7 @@
           <a:p>
             <a:fld id="{50DB7ABA-0172-4F9C-889D-567164F66BCD}" type="datetime1">
               <a:rPr lang="en-US" smtClean="0"/>
-              <a:t>9/18/2024</a:t>
+              <a:t>9/22/2024</a:t>
             </a:fld>
             <a:endParaRPr lang="en-US"/>
           </a:p>
@@ -8481,7 +8704,7 @@
           <a:p>
             <a:fld id="{78AC6A5B-8AE7-4A41-B5A7-9ADC6686DC18}" type="datetime1">
               <a:rPr lang="en-US" smtClean="0"/>
-              <a:t>9/18/2024</a:t>
+              <a:t>9/22/2024</a:t>
             </a:fld>
             <a:endParaRPr lang="en-US"/>
           </a:p>
@@ -8827,7 +9050,7 @@
             <a:fld id="{57E0CF6C-748E-4B7A-BC8B-3011EF78ED13}" type="datetime1">
               <a:rPr lang="en-US" smtClean="0"/>
               <a:pPr/>
-              <a:t>9/18/2024</a:t>
+              <a:t>9/22/2024</a:t>
             </a:fld>
             <a:endParaRPr lang="en-US" dirty="0"/>
           </a:p>
@@ -11143,6 +11366,976 @@
       </p:grpSpPr>
       <p:sp useBgFill="1">
         <p:nvSpPr>
+          <p:cNvPr id="25" name="Rectangle 24">
+            <a:extLst>
+              <a:ext uri="{FF2B5EF4-FFF2-40B4-BE49-F238E27FC236}">
+                <a16:creationId xmlns:a16="http://schemas.microsoft.com/office/drawing/2014/main" id="{8651CFA9-6065-4243-AC48-858E359780B1}"/>
+              </a:ext>
+              <a:ext uri="{C183D7F6-B498-43B3-948B-1728B52AA6E4}">
+                <adec:decorative xmlns:adec="http://schemas.microsoft.com/office/drawing/2017/decorative" val="1"/>
+              </a:ext>
+            </a:extLst>
+          </p:cNvPr>
+          <p:cNvSpPr>
+            <a:spLocks noGrp="1" noRot="1" noChangeAspect="1" noMove="1" noResize="1" noEditPoints="1" noAdjustHandles="1" noChangeArrowheads="1" noChangeShapeType="1" noTextEdit="1"/>
+          </p:cNvSpPr>
+          <p:nvPr>
+            <p:extLst>
+              <p:ext uri="{386F3935-93C4-4BCD-93E2-E3B085C9AB24}">
+                <p16:designElem xmlns:p16="http://schemas.microsoft.com/office/powerpoint/2015/main" val="1"/>
+              </p:ext>
+            </p:extLst>
+          </p:nvPr>
+        </p:nvSpPr>
+        <p:spPr>
+          <a:xfrm>
+            <a:off x="0" y="0"/>
+            <a:ext cx="12188952" cy="6858000"/>
+          </a:xfrm>
+          <a:prstGeom prst="rect">
+            <a:avLst/>
+          </a:prstGeom>
+          <a:ln>
+            <a:noFill/>
+          </a:ln>
+        </p:spPr>
+        <p:style>
+          <a:lnRef idx="2">
+            <a:schemeClr val="accent1">
+              <a:shade val="50000"/>
+            </a:schemeClr>
+          </a:lnRef>
+          <a:fillRef idx="1">
+            <a:schemeClr val="accent1"/>
+          </a:fillRef>
+          <a:effectRef idx="0">
+            <a:schemeClr val="accent1"/>
+          </a:effectRef>
+          <a:fontRef idx="minor">
+            <a:schemeClr val="lt1"/>
+          </a:fontRef>
+        </p:style>
+        <p:txBody>
+          <a:bodyPr rtlCol="0" anchor="ctr"/>
+          <a:lstStyle/>
+          <a:p>
+            <a:pPr algn="ctr"/>
+            <a:endParaRPr lang="en-US">
+              <a:solidFill>
+                <a:schemeClr val="tx1">
+                  <a:lumMod val="65000"/>
+                  <a:lumOff val="35000"/>
+                </a:schemeClr>
+              </a:solidFill>
+              <a:latin typeface="AvenirNext LT Pro Medium" panose="020B0504020202020204" pitchFamily="34" charset="0"/>
+            </a:endParaRPr>
+          </a:p>
+        </p:txBody>
+      </p:sp>
+      <p:sp>
+        <p:nvSpPr>
+          <p:cNvPr id="26" name="Rectangle 25">
+            <a:extLst>
+              <a:ext uri="{FF2B5EF4-FFF2-40B4-BE49-F238E27FC236}">
+                <a16:creationId xmlns:a16="http://schemas.microsoft.com/office/drawing/2014/main" id="{37962AE0-6A1C-4B76-9D52-10E5E6D7D3BB}"/>
+              </a:ext>
+              <a:ext uri="{C183D7F6-B498-43B3-948B-1728B52AA6E4}">
+                <adec:decorative xmlns:adec="http://schemas.microsoft.com/office/drawing/2017/decorative" val="1"/>
+              </a:ext>
+            </a:extLst>
+          </p:cNvPr>
+          <p:cNvSpPr>
+            <a:spLocks noGrp="1" noRot="1" noChangeAspect="1" noMove="1" noResize="1" noEditPoints="1" noAdjustHandles="1" noChangeArrowheads="1" noChangeShapeType="1" noTextEdit="1"/>
+          </p:cNvSpPr>
+          <p:nvPr>
+            <p:extLst>
+              <p:ext uri="{386F3935-93C4-4BCD-93E2-E3B085C9AB24}">
+                <p16:designElem xmlns:p16="http://schemas.microsoft.com/office/powerpoint/2015/main" val="1"/>
+              </p:ext>
+            </p:extLst>
+          </p:nvPr>
+        </p:nvSpPr>
+        <p:spPr>
+          <a:xfrm>
+            <a:off x="0" y="0"/>
+            <a:ext cx="12188952" cy="6858000"/>
+          </a:xfrm>
+          <a:prstGeom prst="rect">
+            <a:avLst/>
+          </a:prstGeom>
+          <a:solidFill>
+            <a:schemeClr val="bg2">
+              <a:alpha val="70000"/>
+            </a:schemeClr>
+          </a:solidFill>
+          <a:ln>
+            <a:noFill/>
+          </a:ln>
+        </p:spPr>
+        <p:style>
+          <a:lnRef idx="2">
+            <a:schemeClr val="accent1">
+              <a:shade val="50000"/>
+            </a:schemeClr>
+          </a:lnRef>
+          <a:fillRef idx="1">
+            <a:schemeClr val="accent1"/>
+          </a:fillRef>
+          <a:effectRef idx="0">
+            <a:schemeClr val="accent1"/>
+          </a:effectRef>
+          <a:fontRef idx="minor">
+            <a:schemeClr val="lt1"/>
+          </a:fontRef>
+        </p:style>
+        <p:txBody>
+          <a:bodyPr rtlCol="0" anchor="ctr"/>
+          <a:lstStyle/>
+          <a:p>
+            <a:pPr algn="ctr"/>
+            <a:endParaRPr lang="en-US">
+              <a:solidFill>
+                <a:schemeClr val="tx1">
+                  <a:lumMod val="65000"/>
+                  <a:lumOff val="35000"/>
+                </a:schemeClr>
+              </a:solidFill>
+              <a:latin typeface="AvenirNext LT Pro Medium" panose="020B0504020202020204" pitchFamily="34" charset="0"/>
+            </a:endParaRPr>
+          </a:p>
+        </p:txBody>
+      </p:sp>
+      <p:sp>
+        <p:nvSpPr>
+          <p:cNvPr id="27" name="Rectangle 26">
+            <a:extLst>
+              <a:ext uri="{FF2B5EF4-FFF2-40B4-BE49-F238E27FC236}">
+                <a16:creationId xmlns:a16="http://schemas.microsoft.com/office/drawing/2014/main" id="{027CAEDE-D92D-4745-8749-71019415A797}"/>
+              </a:ext>
+              <a:ext uri="{C183D7F6-B498-43B3-948B-1728B52AA6E4}">
+                <adec:decorative xmlns:adec="http://schemas.microsoft.com/office/drawing/2017/decorative" val="1"/>
+              </a:ext>
+            </a:extLst>
+          </p:cNvPr>
+          <p:cNvSpPr>
+            <a:spLocks noGrp="1" noRot="1" noChangeAspect="1" noMove="1" noResize="1" noEditPoints="1" noAdjustHandles="1" noChangeArrowheads="1" noChangeShapeType="1" noTextEdit="1"/>
+          </p:cNvSpPr>
+          <p:nvPr>
+            <p:extLst>
+              <p:ext uri="{386F3935-93C4-4BCD-93E2-E3B085C9AB24}">
+                <p16:designElem xmlns:p16="http://schemas.microsoft.com/office/powerpoint/2015/main" val="1"/>
+              </p:ext>
+            </p:extLst>
+          </p:nvPr>
+        </p:nvSpPr>
+        <p:spPr>
+          <a:xfrm>
+            <a:off x="0" y="0"/>
+            <a:ext cx="4572000" cy="6858000"/>
+          </a:xfrm>
+          <a:prstGeom prst="rect">
+            <a:avLst/>
+          </a:prstGeom>
+          <a:solidFill>
+            <a:schemeClr val="tx2">
+              <a:lumMod val="90000"/>
+              <a:lumOff val="10000"/>
+            </a:schemeClr>
+          </a:solidFill>
+          <a:ln>
+            <a:noFill/>
+          </a:ln>
+        </p:spPr>
+        <p:style>
+          <a:lnRef idx="2">
+            <a:schemeClr val="accent1">
+              <a:shade val="50000"/>
+            </a:schemeClr>
+          </a:lnRef>
+          <a:fillRef idx="1">
+            <a:schemeClr val="accent1"/>
+          </a:fillRef>
+          <a:effectRef idx="0">
+            <a:schemeClr val="accent1"/>
+          </a:effectRef>
+          <a:fontRef idx="minor">
+            <a:schemeClr val="lt1"/>
+          </a:fontRef>
+        </p:style>
+        <p:txBody>
+          <a:bodyPr rtlCol="0" anchor="ctr"/>
+          <a:lstStyle/>
+          <a:p>
+            <a:pPr algn="ctr"/>
+            <a:endParaRPr lang="en-US" dirty="0"/>
+          </a:p>
+        </p:txBody>
+      </p:sp>
+      <p:sp>
+        <p:nvSpPr>
+          <p:cNvPr id="28" name="Rectangle 27">
+            <a:extLst>
+              <a:ext uri="{FF2B5EF4-FFF2-40B4-BE49-F238E27FC236}">
+                <a16:creationId xmlns:a16="http://schemas.microsoft.com/office/drawing/2014/main" id="{00C96CB6-3880-40E6-A4BF-F64E7D1E4295}"/>
+              </a:ext>
+              <a:ext uri="{C183D7F6-B498-43B3-948B-1728B52AA6E4}">
+                <adec:decorative xmlns:adec="http://schemas.microsoft.com/office/drawing/2017/decorative" val="1"/>
+              </a:ext>
+            </a:extLst>
+          </p:cNvPr>
+          <p:cNvSpPr>
+            <a:spLocks noGrp="1" noRot="1" noChangeAspect="1" noMove="1" noResize="1" noEditPoints="1" noAdjustHandles="1" noChangeArrowheads="1" noChangeShapeType="1" noTextEdit="1"/>
+          </p:cNvSpPr>
+          <p:nvPr>
+            <p:extLst>
+              <p:ext uri="{386F3935-93C4-4BCD-93E2-E3B085C9AB24}">
+                <p16:designElem xmlns:p16="http://schemas.microsoft.com/office/powerpoint/2015/main" val="1"/>
+              </p:ext>
+            </p:extLst>
+          </p:nvPr>
+        </p:nvSpPr>
+        <p:spPr>
+          <a:xfrm>
+            <a:off x="0" y="0"/>
+            <a:ext cx="4572000" cy="6858000"/>
+          </a:xfrm>
+          <a:prstGeom prst="rect">
+            <a:avLst/>
+          </a:prstGeom>
+          <a:blipFill dpi="0" rotWithShape="1">
+            <a:blip r:embed="rId2">
+              <a:alphaModFix amt="20000"/>
+              <a:duotone>
+                <a:schemeClr val="accent1">
+                  <a:shade val="45000"/>
+                  <a:satMod val="135000"/>
+                </a:schemeClr>
+                <a:prstClr val="white"/>
+              </a:duotone>
+            </a:blip>
+            <a:srcRect/>
+            <a:tile tx="889000" ty="0" sx="100000" sy="100000" flip="none" algn="tl"/>
+          </a:blipFill>
+          <a:ln>
+            <a:noFill/>
+          </a:ln>
+        </p:spPr>
+        <p:style>
+          <a:lnRef idx="2">
+            <a:schemeClr val="accent1">
+              <a:shade val="50000"/>
+            </a:schemeClr>
+          </a:lnRef>
+          <a:fillRef idx="1">
+            <a:schemeClr val="accent1"/>
+          </a:fillRef>
+          <a:effectRef idx="0">
+            <a:schemeClr val="accent1"/>
+          </a:effectRef>
+          <a:fontRef idx="minor">
+            <a:schemeClr val="lt1"/>
+          </a:fontRef>
+        </p:style>
+        <p:txBody>
+          <a:bodyPr rtlCol="0" anchor="ctr"/>
+          <a:lstStyle/>
+          <a:p>
+            <a:pPr algn="ctr"/>
+            <a:endParaRPr lang="en-US" dirty="0"/>
+          </a:p>
+        </p:txBody>
+      </p:sp>
+      <p:sp>
+        <p:nvSpPr>
+          <p:cNvPr id="2" name="Title 1">
+            <a:extLst>
+              <a:ext uri="{FF2B5EF4-FFF2-40B4-BE49-F238E27FC236}">
+                <a16:creationId xmlns:a16="http://schemas.microsoft.com/office/drawing/2014/main" id="{BF37DF44-5B54-1AF8-C9EB-A08ADA9C40BA}"/>
+              </a:ext>
+            </a:extLst>
+          </p:cNvPr>
+          <p:cNvSpPr>
+            <a:spLocks noGrp="1"/>
+          </p:cNvSpPr>
+          <p:nvPr>
+            <p:ph type="title"/>
+          </p:nvPr>
+        </p:nvSpPr>
+        <p:spPr>
+          <a:xfrm>
+            <a:off x="838201" y="559813"/>
+            <a:ext cx="2819399" cy="5577934"/>
+          </a:xfrm>
+        </p:spPr>
+        <p:txBody>
+          <a:bodyPr>
+            <a:normAutofit/>
+          </a:bodyPr>
+          <a:lstStyle/>
+          <a:p>
+            <a:r>
+              <a:rPr lang="en-US" sz="3400"/>
+              <a:t>Likelihood of CVE exploitation by TA505</a:t>
+            </a:r>
+            <a:endParaRPr lang="en-AU" sz="3400"/>
+          </a:p>
+        </p:txBody>
+      </p:sp>
+      <p:graphicFrame>
+        <p:nvGraphicFramePr>
+          <p:cNvPr id="29" name="Content Placeholder 2">
+            <a:extLst>
+              <a:ext uri="{FF2B5EF4-FFF2-40B4-BE49-F238E27FC236}">
+                <a16:creationId xmlns:a16="http://schemas.microsoft.com/office/drawing/2014/main" id="{AF8424D4-9545-EC29-CED9-9C575DF7A055}"/>
+              </a:ext>
+            </a:extLst>
+          </p:cNvPr>
+          <p:cNvGraphicFramePr>
+            <a:graphicFrameLocks noGrp="1"/>
+          </p:cNvGraphicFramePr>
+          <p:nvPr>
+            <p:ph idx="1"/>
+            <p:extLst>
+              <p:ext uri="{D42A27DB-BD31-4B8C-83A1-F6EECF244321}">
+                <p14:modId xmlns:p14="http://schemas.microsoft.com/office/powerpoint/2010/main" val="2815026655"/>
+              </p:ext>
+            </p:extLst>
+          </p:nvPr>
+        </p:nvGraphicFramePr>
+        <p:xfrm>
+          <a:off x="4807223" y="457200"/>
+          <a:ext cx="7003777" cy="5843605"/>
+        </p:xfrm>
+        <a:graphic>
+          <a:graphicData uri="http://schemas.openxmlformats.org/drawingml/2006/diagram">
+            <dgm:relIds xmlns:dgm="http://schemas.openxmlformats.org/drawingml/2006/diagram" xmlns:r="http://schemas.openxmlformats.org/officeDocument/2006/relationships" r:dm="rId3" r:lo="rId4" r:qs="rId5" r:cs="rId6"/>
+          </a:graphicData>
+        </a:graphic>
+      </p:graphicFrame>
+    </p:spTree>
+    <p:extLst>
+      <p:ext uri="{BB962C8B-B14F-4D97-AF65-F5344CB8AC3E}">
+        <p14:creationId xmlns:p14="http://schemas.microsoft.com/office/powerpoint/2010/main" val="2679302679"/>
+      </p:ext>
+    </p:extLst>
+  </p:cSld>
+  <p:clrMapOvr>
+    <a:masterClrMapping/>
+  </p:clrMapOvr>
+</p:sld>
+</file>
+
+<file path=ppt/slides/slide14.xml><?xml version="1.0" encoding="utf-8"?>
+<p:sld xmlns:a="http://schemas.openxmlformats.org/drawingml/2006/main" xmlns:r="http://schemas.openxmlformats.org/officeDocument/2006/relationships" xmlns:p="http://schemas.openxmlformats.org/presentationml/2006/main">
+  <p:cSld>
+    <p:spTree>
+      <p:nvGrpSpPr>
+        <p:cNvPr id="1" name=""/>
+        <p:cNvGrpSpPr/>
+        <p:nvPr/>
+      </p:nvGrpSpPr>
+      <p:grpSpPr>
+        <a:xfrm>
+          <a:off x="0" y="0"/>
+          <a:ext cx="0" cy="0"/>
+          <a:chOff x="0" y="0"/>
+          <a:chExt cx="0" cy="0"/>
+        </a:xfrm>
+      </p:grpSpPr>
+      <p:sp>
+        <p:nvSpPr>
+          <p:cNvPr id="2" name="Title 1">
+            <a:extLst>
+              <a:ext uri="{FF2B5EF4-FFF2-40B4-BE49-F238E27FC236}">
+                <a16:creationId xmlns:a16="http://schemas.microsoft.com/office/drawing/2014/main" id="{59993CE2-90C9-4015-48FA-1924B6F132DB}"/>
+              </a:ext>
+            </a:extLst>
+          </p:cNvPr>
+          <p:cNvSpPr>
+            <a:spLocks noGrp="1"/>
+          </p:cNvSpPr>
+          <p:nvPr>
+            <p:ph type="title"/>
+          </p:nvPr>
+        </p:nvSpPr>
+        <p:spPr/>
+        <p:txBody>
+          <a:bodyPr/>
+          <a:lstStyle/>
+          <a:p>
+            <a:r>
+              <a:rPr lang="en-AU" dirty="0"/>
+              <a:t>Likelihood of CVE’s</a:t>
+            </a:r>
+          </a:p>
+        </p:txBody>
+      </p:sp>
+      <p:sp>
+        <p:nvSpPr>
+          <p:cNvPr id="3" name="Content Placeholder 2">
+            <a:extLst>
+              <a:ext uri="{FF2B5EF4-FFF2-40B4-BE49-F238E27FC236}">
+                <a16:creationId xmlns:a16="http://schemas.microsoft.com/office/drawing/2014/main" id="{25724BE3-079D-3BC8-92A9-1E52E9CE0D60}"/>
+              </a:ext>
+            </a:extLst>
+          </p:cNvPr>
+          <p:cNvSpPr>
+            <a:spLocks noGrp="1"/>
+          </p:cNvSpPr>
+          <p:nvPr>
+            <p:ph idx="1"/>
+          </p:nvPr>
+        </p:nvSpPr>
+        <p:spPr>
+          <a:xfrm>
+            <a:off x="778932" y="1752733"/>
+            <a:ext cx="10515600" cy="4195763"/>
+          </a:xfrm>
+        </p:spPr>
+        <p:txBody>
+          <a:bodyPr/>
+          <a:lstStyle/>
+          <a:p>
+            <a:pPr marL="0" indent="0">
+              <a:buNone/>
+            </a:pPr>
+            <a:r>
+              <a:rPr lang="en-AU" dirty="0"/>
+              <a:t>All CVE’s have very similar in nature properties</a:t>
+            </a:r>
+            <a:endParaRPr lang="en-US" dirty="0"/>
+          </a:p>
+        </p:txBody>
+      </p:sp>
+      <p:graphicFrame>
+        <p:nvGraphicFramePr>
+          <p:cNvPr id="4" name="Content Placeholder 3">
+            <a:extLst>
+              <a:ext uri="{FF2B5EF4-FFF2-40B4-BE49-F238E27FC236}">
+                <a16:creationId xmlns:a16="http://schemas.microsoft.com/office/drawing/2014/main" id="{DB03D4D1-ECA8-CF05-6233-EBF480BD0E5F}"/>
+              </a:ext>
+            </a:extLst>
+          </p:cNvPr>
+          <p:cNvGraphicFramePr>
+            <a:graphicFrameLocks/>
+          </p:cNvGraphicFramePr>
+          <p:nvPr>
+            <p:extLst>
+              <p:ext uri="{D42A27DB-BD31-4B8C-83A1-F6EECF244321}">
+                <p14:modId xmlns:p14="http://schemas.microsoft.com/office/powerpoint/2010/main" val="2917699526"/>
+              </p:ext>
+            </p:extLst>
+          </p:nvPr>
+        </p:nvGraphicFramePr>
+        <p:xfrm>
+          <a:off x="778932" y="2458536"/>
+          <a:ext cx="10515600" cy="3241040"/>
+        </p:xfrm>
+        <a:graphic>
+          <a:graphicData uri="http://schemas.openxmlformats.org/drawingml/2006/table">
+            <a:tbl>
+              <a:tblPr firstRow="1" bandRow="1">
+                <a:tableStyleId>{5C22544A-7EE6-4342-B048-85BDC9FD1C3A}</a:tableStyleId>
+              </a:tblPr>
+              <a:tblGrid>
+                <a:gridCol w="2628900">
+                  <a:extLst>
+                    <a:ext uri="{9D8B030D-6E8A-4147-A177-3AD203B41FA5}">
+                      <a16:colId xmlns:a16="http://schemas.microsoft.com/office/drawing/2014/main" val="1943194798"/>
+                    </a:ext>
+                  </a:extLst>
+                </a:gridCol>
+                <a:gridCol w="2628900">
+                  <a:extLst>
+                    <a:ext uri="{9D8B030D-6E8A-4147-A177-3AD203B41FA5}">
+                      <a16:colId xmlns:a16="http://schemas.microsoft.com/office/drawing/2014/main" val="2262371204"/>
+                    </a:ext>
+                  </a:extLst>
+                </a:gridCol>
+                <a:gridCol w="2628900">
+                  <a:extLst>
+                    <a:ext uri="{9D8B030D-6E8A-4147-A177-3AD203B41FA5}">
+                      <a16:colId xmlns:a16="http://schemas.microsoft.com/office/drawing/2014/main" val="2790487299"/>
+                    </a:ext>
+                  </a:extLst>
+                </a:gridCol>
+                <a:gridCol w="2628900">
+                  <a:extLst>
+                    <a:ext uri="{9D8B030D-6E8A-4147-A177-3AD203B41FA5}">
+                      <a16:colId xmlns:a16="http://schemas.microsoft.com/office/drawing/2014/main" val="520172856"/>
+                    </a:ext>
+                  </a:extLst>
+                </a:gridCol>
+              </a:tblGrid>
+              <a:tr h="370840">
+                <a:tc>
+                  <a:txBody>
+                    <a:bodyPr/>
+                    <a:lstStyle/>
+                    <a:p>
+                      <a:r>
+                        <a:rPr lang="en-AU" sz="1400" dirty="0"/>
+                        <a:t>CWE</a:t>
+                      </a:r>
+                    </a:p>
+                  </a:txBody>
+                  <a:tcPr/>
+                </a:tc>
+                <a:tc>
+                  <a:txBody>
+                    <a:bodyPr/>
+                    <a:lstStyle/>
+                    <a:p>
+                      <a:r>
+                        <a:rPr lang="en-AU" sz="1400" dirty="0"/>
+                        <a:t>CAPEC</a:t>
+                      </a:r>
+                    </a:p>
+                  </a:txBody>
+                  <a:tcPr/>
+                </a:tc>
+                <a:tc>
+                  <a:txBody>
+                    <a:bodyPr/>
+                    <a:lstStyle/>
+                    <a:p>
+                      <a:r>
+                        <a:rPr lang="en-AU" sz="1400" dirty="0"/>
+                        <a:t>ATT&amp;CK</a:t>
+                      </a:r>
+                    </a:p>
+                  </a:txBody>
+                  <a:tcPr/>
+                </a:tc>
+                <a:tc>
+                  <a:txBody>
+                    <a:bodyPr/>
+                    <a:lstStyle/>
+                    <a:p>
+                      <a:r>
+                        <a:rPr lang="en-AU" sz="1400" dirty="0"/>
+                        <a:t>Used By Threat Actor</a:t>
+                      </a:r>
+                    </a:p>
+                  </a:txBody>
+                  <a:tcPr/>
+                </a:tc>
+                <a:extLst>
+                  <a:ext uri="{0D108BD9-81ED-4DB2-BD59-A6C34878D82A}">
+                    <a16:rowId xmlns:a16="http://schemas.microsoft.com/office/drawing/2014/main" val="313131853"/>
+                  </a:ext>
+                </a:extLst>
+              </a:tr>
+              <a:tr h="370840">
+                <a:tc>
+                  <a:txBody>
+                    <a:bodyPr/>
+                    <a:lstStyle/>
+                    <a:p>
+                      <a:r>
+                        <a:rPr lang="en-AU" sz="1400" dirty="0"/>
+                        <a:t>89</a:t>
+                      </a:r>
+                    </a:p>
+                  </a:txBody>
+                  <a:tcPr/>
+                </a:tc>
+                <a:tc>
+                  <a:txBody>
+                    <a:bodyPr/>
+                    <a:lstStyle/>
+                    <a:p>
+                      <a:r>
+                        <a:rPr lang="en-AU" sz="1400" dirty="0"/>
+                        <a:t>108 - </a:t>
+                      </a:r>
+                      <a:r>
+                        <a:rPr lang="en-US" sz="1400" b="0" i="0" kern="1200" dirty="0">
+                          <a:solidFill>
+                            <a:schemeClr val="dk1"/>
+                          </a:solidFill>
+                          <a:effectLst/>
+                          <a:latin typeface="+mn-lt"/>
+                          <a:ea typeface="+mn-ea"/>
+                          <a:cs typeface="+mn-cs"/>
+                        </a:rPr>
+                        <a:t>Command Line Execution through SQL Injection</a:t>
+                      </a:r>
+                    </a:p>
+                  </a:txBody>
+                  <a:tcPr/>
+                </a:tc>
+                <a:tc>
+                  <a:txBody>
+                    <a:bodyPr/>
+                    <a:lstStyle/>
+                    <a:p>
+                      <a:r>
+                        <a:rPr lang="en-AU" sz="1400" dirty="0"/>
+                        <a:t>T1059 - Command and Scripting Interpreter</a:t>
+                      </a:r>
+                    </a:p>
+                  </a:txBody>
+                  <a:tcPr/>
+                </a:tc>
+                <a:tc>
+                  <a:txBody>
+                    <a:bodyPr/>
+                    <a:lstStyle/>
+                    <a:p>
+                      <a:r>
+                        <a:rPr lang="en-AU" sz="1400" dirty="0"/>
+                        <a:t>Yes, TA505 uses command line execution, but not through SQL injection</a:t>
+                      </a:r>
+                    </a:p>
+                  </a:txBody>
+                  <a:tcPr/>
+                </a:tc>
+                <a:extLst>
+                  <a:ext uri="{0D108BD9-81ED-4DB2-BD59-A6C34878D82A}">
+                    <a16:rowId xmlns:a16="http://schemas.microsoft.com/office/drawing/2014/main" val="1360724657"/>
+                  </a:ext>
+                </a:extLst>
+              </a:tr>
+              <a:tr h="370840">
+                <a:tc>
+                  <a:txBody>
+                    <a:bodyPr/>
+                    <a:lstStyle/>
+                    <a:p>
+                      <a:endParaRPr lang="en-AU" sz="1400" dirty="0"/>
+                    </a:p>
+                  </a:txBody>
+                  <a:tcPr/>
+                </a:tc>
+                <a:tc>
+                  <a:txBody>
+                    <a:bodyPr/>
+                    <a:lstStyle/>
+                    <a:p>
+                      <a:r>
+                        <a:rPr lang="en-US" sz="1400" b="0" i="0" kern="1200" dirty="0">
+                          <a:solidFill>
+                            <a:schemeClr val="dk1"/>
+                          </a:solidFill>
+                          <a:effectLst/>
+                          <a:latin typeface="+mn-lt"/>
+                          <a:ea typeface="+mn-ea"/>
+                          <a:cs typeface="+mn-cs"/>
+                        </a:rPr>
+                        <a:t>470 - Expanding Control over the Operating System from the Database</a:t>
+                      </a:r>
+                    </a:p>
+                  </a:txBody>
+                  <a:tcPr/>
+                </a:tc>
+                <a:tc>
+                  <a:txBody>
+                    <a:bodyPr/>
+                    <a:lstStyle/>
+                    <a:p>
+                      <a:r>
+                        <a:rPr lang="en-AU" sz="1400" dirty="0"/>
+                        <a:t>T1534 - Internal </a:t>
+                      </a:r>
+                      <a:r>
+                        <a:rPr lang="en-AU" sz="1400" dirty="0" err="1"/>
+                        <a:t>Spearphishing</a:t>
+                      </a:r>
+                      <a:endParaRPr lang="en-AU" sz="1400" dirty="0"/>
+                    </a:p>
+                  </a:txBody>
+                  <a:tcPr/>
+                </a:tc>
+                <a:tc>
+                  <a:txBody>
+                    <a:bodyPr/>
+                    <a:lstStyle/>
+                    <a:p>
+                      <a:r>
+                        <a:rPr lang="en-AU" sz="1400" dirty="0"/>
+                        <a:t>No, not in ATT&amp;CK</a:t>
+                      </a:r>
+                    </a:p>
+                  </a:txBody>
+                  <a:tcPr/>
+                </a:tc>
+                <a:extLst>
+                  <a:ext uri="{0D108BD9-81ED-4DB2-BD59-A6C34878D82A}">
+                    <a16:rowId xmlns:a16="http://schemas.microsoft.com/office/drawing/2014/main" val="1211301294"/>
+                  </a:ext>
+                </a:extLst>
+              </a:tr>
+              <a:tr h="370840">
+                <a:tc>
+                  <a:txBody>
+                    <a:bodyPr/>
+                    <a:lstStyle/>
+                    <a:p>
+                      <a:endParaRPr lang="en-AU" sz="1400" dirty="0"/>
+                    </a:p>
+                  </a:txBody>
+                  <a:tcPr/>
+                </a:tc>
+                <a:tc>
+                  <a:txBody>
+                    <a:bodyPr/>
+                    <a:lstStyle/>
+                    <a:p>
+                      <a:endParaRPr lang="en-US" sz="1400" b="0" i="0" kern="1200" dirty="0">
+                        <a:solidFill>
+                          <a:schemeClr val="dk1"/>
+                        </a:solidFill>
+                        <a:effectLst/>
+                        <a:latin typeface="+mn-lt"/>
+                        <a:ea typeface="+mn-ea"/>
+                        <a:cs typeface="+mn-cs"/>
+                      </a:endParaRPr>
+                    </a:p>
+                  </a:txBody>
+                  <a:tcPr/>
+                </a:tc>
+                <a:tc>
+                  <a:txBody>
+                    <a:bodyPr/>
+                    <a:lstStyle/>
+                    <a:p>
+                      <a:r>
+                        <a:rPr lang="en-AU" sz="1400" dirty="0"/>
+                        <a:t>T1659 - Content Injection</a:t>
+                      </a:r>
+                    </a:p>
+                  </a:txBody>
+                  <a:tcPr/>
+                </a:tc>
+                <a:tc>
+                  <a:txBody>
+                    <a:bodyPr/>
+                    <a:lstStyle/>
+                    <a:p>
+                      <a:r>
+                        <a:rPr lang="en-AU" sz="1400" dirty="0"/>
+                        <a:t>No, not in ATT&amp;CK</a:t>
+                      </a:r>
+                    </a:p>
+                  </a:txBody>
+                  <a:tcPr/>
+                </a:tc>
+                <a:extLst>
+                  <a:ext uri="{0D108BD9-81ED-4DB2-BD59-A6C34878D82A}">
+                    <a16:rowId xmlns:a16="http://schemas.microsoft.com/office/drawing/2014/main" val="2231356956"/>
+                  </a:ext>
+                </a:extLst>
+              </a:tr>
+              <a:tr h="370840">
+                <a:tc>
+                  <a:txBody>
+                    <a:bodyPr/>
+                    <a:lstStyle/>
+                    <a:p>
+                      <a:endParaRPr lang="en-AU" sz="1400" dirty="0"/>
+                    </a:p>
+                  </a:txBody>
+                  <a:tcPr/>
+                </a:tc>
+                <a:tc>
+                  <a:txBody>
+                    <a:bodyPr/>
+                    <a:lstStyle/>
+                    <a:p>
+                      <a:r>
+                        <a:rPr lang="en-US" sz="1400" b="0" i="0" kern="1200" dirty="0">
+                          <a:solidFill>
+                            <a:schemeClr val="dk1"/>
+                          </a:solidFill>
+                          <a:effectLst/>
+                          <a:latin typeface="+mn-lt"/>
+                          <a:ea typeface="+mn-ea"/>
+                          <a:cs typeface="+mn-cs"/>
+                        </a:rPr>
+                        <a:t>109 - Object Relational Mapping Injection</a:t>
+                      </a:r>
+                    </a:p>
+                  </a:txBody>
+                  <a:tcPr/>
+                </a:tc>
+                <a:tc>
+                  <a:txBody>
+                    <a:bodyPr/>
+                    <a:lstStyle/>
+                    <a:p>
+                      <a:r>
+                        <a:rPr lang="en-AU" sz="1400" dirty="0"/>
+                        <a:t>T1650 - Acquire Access</a:t>
+                      </a:r>
+                    </a:p>
+                  </a:txBody>
+                  <a:tcPr/>
+                </a:tc>
+                <a:tc>
+                  <a:txBody>
+                    <a:bodyPr/>
+                    <a:lstStyle/>
+                    <a:p>
+                      <a:pPr marL="0" marR="0" lvl="0" indent="0" algn="l" defTabSz="914400" rtl="0" eaLnBrk="1" fontAlgn="auto" latinLnBrk="0" hangingPunct="1">
+                        <a:lnSpc>
+                          <a:spcPct val="100000"/>
+                        </a:lnSpc>
+                        <a:spcBef>
+                          <a:spcPts val="0"/>
+                        </a:spcBef>
+                        <a:spcAft>
+                          <a:spcPts val="0"/>
+                        </a:spcAft>
+                        <a:buClrTx/>
+                        <a:buSzTx/>
+                        <a:buFontTx/>
+                        <a:buNone/>
+                        <a:tabLst/>
+                        <a:defRPr/>
+                      </a:pPr>
+                      <a:r>
+                        <a:rPr lang="en-AU" sz="1400" dirty="0"/>
+                        <a:t>No, not in ATT&amp;CK</a:t>
+                      </a:r>
+                    </a:p>
+                  </a:txBody>
+                  <a:tcPr/>
+                </a:tc>
+                <a:extLst>
+                  <a:ext uri="{0D108BD9-81ED-4DB2-BD59-A6C34878D82A}">
+                    <a16:rowId xmlns:a16="http://schemas.microsoft.com/office/drawing/2014/main" val="3758963075"/>
+                  </a:ext>
+                </a:extLst>
+              </a:tr>
+              <a:tr h="370840">
+                <a:tc>
+                  <a:txBody>
+                    <a:bodyPr/>
+                    <a:lstStyle/>
+                    <a:p>
+                      <a:endParaRPr lang="en-AU" sz="1400" dirty="0"/>
+                    </a:p>
+                  </a:txBody>
+                  <a:tcPr/>
+                </a:tc>
+                <a:tc>
+                  <a:txBody>
+                    <a:bodyPr/>
+                    <a:lstStyle/>
+                    <a:p>
+                      <a:r>
+                        <a:rPr lang="en-US" sz="1400" b="0" i="0" kern="1200" dirty="0">
+                          <a:solidFill>
+                            <a:schemeClr val="dk1"/>
+                          </a:solidFill>
+                          <a:effectLst/>
+                          <a:latin typeface="+mn-lt"/>
+                          <a:ea typeface="+mn-ea"/>
+                          <a:cs typeface="+mn-cs"/>
+                        </a:rPr>
+                        <a:t>110 - SQL Injection through SOAP Parameter Tampering</a:t>
+                      </a:r>
+                    </a:p>
+                  </a:txBody>
+                  <a:tcPr/>
+                </a:tc>
+                <a:tc>
+                  <a:txBody>
+                    <a:bodyPr/>
+                    <a:lstStyle/>
+                    <a:p>
+                      <a:r>
+                        <a:rPr lang="en-AU" sz="1400" dirty="0"/>
+                        <a:t>T1190 - Exploit Public-Facing Application</a:t>
+                      </a:r>
+                    </a:p>
+                  </a:txBody>
+                  <a:tcPr/>
+                </a:tc>
+                <a:tc>
+                  <a:txBody>
+                    <a:bodyPr/>
+                    <a:lstStyle/>
+                    <a:p>
+                      <a:pPr marL="0" marR="0" lvl="0" indent="0" algn="l" defTabSz="914400" rtl="0" eaLnBrk="1" fontAlgn="auto" latinLnBrk="0" hangingPunct="1">
+                        <a:lnSpc>
+                          <a:spcPct val="100000"/>
+                        </a:lnSpc>
+                        <a:spcBef>
+                          <a:spcPts val="0"/>
+                        </a:spcBef>
+                        <a:spcAft>
+                          <a:spcPts val="0"/>
+                        </a:spcAft>
+                        <a:buClrTx/>
+                        <a:buSzTx/>
+                        <a:buFontTx/>
+                        <a:buNone/>
+                        <a:tabLst/>
+                        <a:defRPr/>
+                      </a:pPr>
+                      <a:r>
+                        <a:rPr lang="en-AU" sz="1400" dirty="0"/>
+                        <a:t>No, not in ATT&amp;CK</a:t>
+                      </a:r>
+                    </a:p>
+                    <a:p>
+                      <a:endParaRPr lang="en-AU" sz="1400" dirty="0"/>
+                    </a:p>
+                  </a:txBody>
+                  <a:tcPr/>
+                </a:tc>
+                <a:extLst>
+                  <a:ext uri="{0D108BD9-81ED-4DB2-BD59-A6C34878D82A}">
+                    <a16:rowId xmlns:a16="http://schemas.microsoft.com/office/drawing/2014/main" val="1500583458"/>
+                  </a:ext>
+                </a:extLst>
+              </a:tr>
+            </a:tbl>
+          </a:graphicData>
+        </a:graphic>
+      </p:graphicFrame>
+    </p:spTree>
+    <p:extLst>
+      <p:ext uri="{BB962C8B-B14F-4D97-AF65-F5344CB8AC3E}">
+        <p14:creationId xmlns:p14="http://schemas.microsoft.com/office/powerpoint/2010/main" val="2030101805"/>
+      </p:ext>
+    </p:extLst>
+  </p:cSld>
+  <p:clrMapOvr>
+    <a:masterClrMapping/>
+  </p:clrMapOvr>
+</p:sld>
+</file>
+
+<file path=ppt/slides/slide15.xml><?xml version="1.0" encoding="utf-8"?>
+<p:sld xmlns:a="http://schemas.openxmlformats.org/drawingml/2006/main" xmlns:r="http://schemas.openxmlformats.org/officeDocument/2006/relationships" xmlns:p="http://schemas.openxmlformats.org/presentationml/2006/main">
+  <p:cSld>
+    <p:bg>
+      <p:bgPr>
+        <a:solidFill>
+          <a:schemeClr val="bg1"/>
+        </a:solidFill>
+        <a:effectLst/>
+      </p:bgPr>
+    </p:bg>
+    <p:spTree>
+      <p:nvGrpSpPr>
+        <p:cNvPr id="1" name=""/>
+        <p:cNvGrpSpPr/>
+        <p:nvPr/>
+      </p:nvGrpSpPr>
+      <p:grpSpPr>
+        <a:xfrm>
+          <a:off x="0" y="0"/>
+          <a:ext cx="0" cy="0"/>
+          <a:chOff x="0" y="0"/>
+          <a:chExt cx="0" cy="0"/>
+        </a:xfrm>
+      </p:grpSpPr>
+      <p:sp useBgFill="1">
+        <p:nvSpPr>
           <p:cNvPr id="26" name="Rectangle 25">
             <a:extLst>
               <a:ext uri="{FF2B5EF4-FFF2-40B4-BE49-F238E27FC236}">
@@ -11350,24 +12543,62 @@
           <a:lstStyle/>
           <a:p>
             <a:r>
+              <a:rPr lang="en-US" sz="1800" dirty="0">
+                <a:solidFill>
+                  <a:schemeClr val="tx1"/>
+                </a:solidFill>
+              </a:rPr>
+              <a:t>All of </a:t>
+            </a:r>
+            <a:r>
               <a:rPr lang="en-US" sz="1800" dirty="0" err="1">
                 <a:solidFill>
-                  <a:srgbClr val="FF0000"/>
+                  <a:schemeClr val="tx1"/>
                 </a:solidFill>
               </a:rPr>
-              <a:t>Prioritise</a:t>
+              <a:t>these’s</a:t>
             </a:r>
             <a:r>
               <a:rPr lang="en-US" sz="1800" dirty="0">
                 <a:solidFill>
-                  <a:srgbClr val="FF0000"/>
+                  <a:schemeClr val="tx1"/>
                 </a:solidFill>
               </a:rPr>
-              <a:t> the vulnerabilities you have found based on their likelihood of exploitation by the Threat Actor within your information system. Choose the three CVEs most likely to be exploited and provide rationales using CAPECs and CWEs. Add three slides to your PowerPoint slides: one slide for each CVE. Each slide should include an analysis table like the following.</a:t>
+              <a:t> CVE’s are very similar in nature</a:t>
+            </a:r>
+          </a:p>
+          <a:p>
+            <a:r>
+              <a:rPr lang="en-US" sz="1800" dirty="0">
+                <a:solidFill>
+                  <a:schemeClr val="tx1"/>
+                </a:solidFill>
+              </a:rPr>
+              <a:t>All CVE’s have SQL Injection</a:t>
+            </a:r>
+          </a:p>
+          <a:p>
+            <a:r>
+              <a:rPr lang="en-US" sz="1800" dirty="0">
+                <a:solidFill>
+                  <a:schemeClr val="tx1"/>
+                </a:solidFill>
+              </a:rPr>
+              <a:t>TA505 techniques don’t match with the techniques from the CVE’s</a:t>
+            </a:r>
+          </a:p>
+          <a:p>
+            <a:r>
+              <a:rPr lang="en-US" sz="1800" dirty="0">
+                <a:solidFill>
+                  <a:schemeClr val="tx1"/>
+                </a:solidFill>
+              </a:rPr>
+              <a:t>Unlikely that these vulnerabilities are exploited by TA505</a:t>
             </a:r>
             <a:endParaRPr lang="en-AU" sz="1800" dirty="0">
               <a:solidFill>
-                <a:srgbClr val="FF0000"/>
+                <a:schemeClr val="tx1"/>
               </a:solidFill>
             </a:endParaRPr>
           </a:p>
@@ -11594,36 +12825,242 @@
           </a:p>
         </p:txBody>
       </p:sp>
-      <p:pic>
-        <p:nvPicPr>
-          <p:cNvPr id="6" name="Picture 5" descr="A screenshot of a computer&#10;&#10;Description automatically generated">
-            <a:extLst>
-              <a:ext uri="{FF2B5EF4-FFF2-40B4-BE49-F238E27FC236}">
-                <a16:creationId xmlns:a16="http://schemas.microsoft.com/office/drawing/2014/main" id="{36E78D41-BBA9-AF76-6B20-182E6D29AD2B}"/>
-              </a:ext>
-            </a:extLst>
-          </p:cNvPr>
-          <p:cNvPicPr>
-            <a:picLocks noChangeAspect="1"/>
-          </p:cNvPicPr>
+      <p:sp>
+        <p:nvSpPr>
+          <p:cNvPr id="4" name="Content Placeholder 2">
+            <a:extLst>
+              <a:ext uri="{FF2B5EF4-FFF2-40B4-BE49-F238E27FC236}">
+                <a16:creationId xmlns:a16="http://schemas.microsoft.com/office/drawing/2014/main" id="{F8FBC88C-32A6-F142-C3DB-8589D7DBCDA2}"/>
+              </a:ext>
+            </a:extLst>
+          </p:cNvPr>
+          <p:cNvSpPr txBox="1">
+            <a:spLocks/>
+          </p:cNvSpPr>
           <p:nvPr/>
-        </p:nvPicPr>
-        <p:blipFill>
-          <a:blip r:embed="rId3"/>
-          <a:stretch>
-            <a:fillRect/>
-          </a:stretch>
-        </p:blipFill>
+        </p:nvSpPr>
         <p:spPr>
           <a:xfrm>
-            <a:off x="7319344" y="567942"/>
-            <a:ext cx="3801713" cy="5716862"/>
+            <a:off x="7066197" y="1963698"/>
+            <a:ext cx="4533135" cy="2642168"/>
           </a:xfrm>
           <a:prstGeom prst="rect">
             <a:avLst/>
           </a:prstGeom>
         </p:spPr>
-      </p:pic>
+        <p:txBody>
+          <a:bodyPr vert="horz" lIns="91440" tIns="45720" rIns="91440" bIns="45720" rtlCol="0">
+            <a:normAutofit/>
+          </a:bodyPr>
+          <a:lstStyle>
+            <a:lvl1pPr marL="228600" indent="-228600" algn="l" defTabSz="914400" rtl="0" eaLnBrk="1" latinLnBrk="0" hangingPunct="1">
+              <a:lnSpc>
+                <a:spcPct val="110000"/>
+              </a:lnSpc>
+              <a:spcBef>
+                <a:spcPts val="1000"/>
+              </a:spcBef>
+              <a:buClr>
+                <a:schemeClr val="accent1"/>
+              </a:buClr>
+              <a:buFont typeface="Arial" panose="020B0604020202020204" pitchFamily="34" charset="0"/>
+              <a:buChar char="•"/>
+              <a:defRPr sz="2800" kern="1200">
+                <a:solidFill>
+                  <a:schemeClr val="bg1"/>
+                </a:solidFill>
+                <a:latin typeface="+mn-lt"/>
+                <a:ea typeface="+mn-ea"/>
+                <a:cs typeface="+mn-cs"/>
+              </a:defRPr>
+            </a:lvl1pPr>
+            <a:lvl2pPr marL="685800" indent="-228600" algn="l" defTabSz="914400" rtl="0" eaLnBrk="1" latinLnBrk="0" hangingPunct="1">
+              <a:lnSpc>
+                <a:spcPct val="110000"/>
+              </a:lnSpc>
+              <a:spcBef>
+                <a:spcPts val="500"/>
+              </a:spcBef>
+              <a:buClr>
+                <a:schemeClr val="accent1"/>
+              </a:buClr>
+              <a:buFont typeface="Arial" panose="020B0604020202020204" pitchFamily="34" charset="0"/>
+              <a:buChar char="•"/>
+              <a:defRPr sz="2400" kern="1200">
+                <a:solidFill>
+                  <a:schemeClr val="bg1"/>
+                </a:solidFill>
+                <a:latin typeface="+mn-lt"/>
+                <a:ea typeface="+mn-ea"/>
+                <a:cs typeface="+mn-cs"/>
+              </a:defRPr>
+            </a:lvl2pPr>
+            <a:lvl3pPr marL="1143000" indent="-228600" algn="l" defTabSz="914400" rtl="0" eaLnBrk="1" latinLnBrk="0" hangingPunct="1">
+              <a:lnSpc>
+                <a:spcPct val="110000"/>
+              </a:lnSpc>
+              <a:spcBef>
+                <a:spcPts val="500"/>
+              </a:spcBef>
+              <a:buClr>
+                <a:schemeClr val="accent1"/>
+              </a:buClr>
+              <a:buFont typeface="Arial" panose="020B0604020202020204" pitchFamily="34" charset="0"/>
+              <a:buChar char="•"/>
+              <a:defRPr sz="2000" kern="1200">
+                <a:solidFill>
+                  <a:schemeClr val="bg1"/>
+                </a:solidFill>
+                <a:latin typeface="+mn-lt"/>
+                <a:ea typeface="+mn-ea"/>
+                <a:cs typeface="+mn-cs"/>
+              </a:defRPr>
+            </a:lvl3pPr>
+            <a:lvl4pPr marL="1600200" indent="-228600" algn="l" defTabSz="914400" rtl="0" eaLnBrk="1" latinLnBrk="0" hangingPunct="1">
+              <a:lnSpc>
+                <a:spcPct val="110000"/>
+              </a:lnSpc>
+              <a:spcBef>
+                <a:spcPts val="500"/>
+              </a:spcBef>
+              <a:buClr>
+                <a:schemeClr val="accent1"/>
+              </a:buClr>
+              <a:buFont typeface="Arial" panose="020B0604020202020204" pitchFamily="34" charset="0"/>
+              <a:buChar char="•"/>
+              <a:defRPr sz="1800" kern="1200">
+                <a:solidFill>
+                  <a:schemeClr val="bg1"/>
+                </a:solidFill>
+                <a:latin typeface="+mn-lt"/>
+                <a:ea typeface="+mn-ea"/>
+                <a:cs typeface="+mn-cs"/>
+              </a:defRPr>
+            </a:lvl4pPr>
+            <a:lvl5pPr marL="2057400" indent="-228600" algn="l" defTabSz="914400" rtl="0" eaLnBrk="1" latinLnBrk="0" hangingPunct="1">
+              <a:lnSpc>
+                <a:spcPct val="110000"/>
+              </a:lnSpc>
+              <a:spcBef>
+                <a:spcPts val="500"/>
+              </a:spcBef>
+              <a:buClr>
+                <a:schemeClr val="accent1"/>
+              </a:buClr>
+              <a:buFont typeface="Arial" panose="020B0604020202020204" pitchFamily="34" charset="0"/>
+              <a:buChar char="•"/>
+              <a:defRPr sz="1800" kern="1200">
+                <a:solidFill>
+                  <a:schemeClr val="bg1"/>
+                </a:solidFill>
+                <a:latin typeface="+mn-lt"/>
+                <a:ea typeface="+mn-ea"/>
+                <a:cs typeface="+mn-cs"/>
+              </a:defRPr>
+            </a:lvl5pPr>
+            <a:lvl6pPr marL="2514600" indent="-228600" algn="l" defTabSz="914400" rtl="0" eaLnBrk="1" latinLnBrk="0" hangingPunct="1">
+              <a:lnSpc>
+                <a:spcPct val="90000"/>
+              </a:lnSpc>
+              <a:spcBef>
+                <a:spcPts val="500"/>
+              </a:spcBef>
+              <a:buFont typeface="Arial" panose="020B0604020202020204" pitchFamily="34" charset="0"/>
+              <a:buChar char="•"/>
+              <a:defRPr sz="1800" kern="1200">
+                <a:solidFill>
+                  <a:schemeClr val="tx1"/>
+                </a:solidFill>
+                <a:latin typeface="+mn-lt"/>
+                <a:ea typeface="+mn-ea"/>
+                <a:cs typeface="+mn-cs"/>
+              </a:defRPr>
+            </a:lvl6pPr>
+            <a:lvl7pPr marL="2971800" indent="-228600" algn="l" defTabSz="914400" rtl="0" eaLnBrk="1" latinLnBrk="0" hangingPunct="1">
+              <a:lnSpc>
+                <a:spcPct val="90000"/>
+              </a:lnSpc>
+              <a:spcBef>
+                <a:spcPts val="500"/>
+              </a:spcBef>
+              <a:buFont typeface="Arial" panose="020B0604020202020204" pitchFamily="34" charset="0"/>
+              <a:buChar char="•"/>
+              <a:defRPr sz="1800" kern="1200">
+                <a:solidFill>
+                  <a:schemeClr val="tx1"/>
+                </a:solidFill>
+                <a:latin typeface="+mn-lt"/>
+                <a:ea typeface="+mn-ea"/>
+                <a:cs typeface="+mn-cs"/>
+              </a:defRPr>
+            </a:lvl7pPr>
+            <a:lvl8pPr marL="3429000" indent="-228600" algn="l" defTabSz="914400" rtl="0" eaLnBrk="1" latinLnBrk="0" hangingPunct="1">
+              <a:lnSpc>
+                <a:spcPct val="90000"/>
+              </a:lnSpc>
+              <a:spcBef>
+                <a:spcPts val="500"/>
+              </a:spcBef>
+              <a:buFont typeface="Arial" panose="020B0604020202020204" pitchFamily="34" charset="0"/>
+              <a:buChar char="•"/>
+              <a:defRPr sz="1800" kern="1200">
+                <a:solidFill>
+                  <a:schemeClr val="tx1"/>
+                </a:solidFill>
+                <a:latin typeface="+mn-lt"/>
+                <a:ea typeface="+mn-ea"/>
+                <a:cs typeface="+mn-cs"/>
+              </a:defRPr>
+            </a:lvl8pPr>
+            <a:lvl9pPr marL="3886200" indent="-228600" algn="l" defTabSz="914400" rtl="0" eaLnBrk="1" latinLnBrk="0" hangingPunct="1">
+              <a:lnSpc>
+                <a:spcPct val="90000"/>
+              </a:lnSpc>
+              <a:spcBef>
+                <a:spcPts val="500"/>
+              </a:spcBef>
+              <a:buFont typeface="Arial" panose="020B0604020202020204" pitchFamily="34" charset="0"/>
+              <a:buChar char="•"/>
+              <a:defRPr sz="1800" kern="1200">
+                <a:solidFill>
+                  <a:schemeClr val="tx1"/>
+                </a:solidFill>
+                <a:latin typeface="+mn-lt"/>
+                <a:ea typeface="+mn-ea"/>
+                <a:cs typeface="+mn-cs"/>
+              </a:defRPr>
+            </a:lvl9pPr>
+          </a:lstStyle>
+          <a:p>
+            <a:pPr marL="0" indent="0">
+              <a:buNone/>
+            </a:pPr>
+            <a:r>
+              <a:rPr lang="en-AU" sz="4000" b="1" dirty="0"/>
+              <a:t>CVE-2023-34362</a:t>
+            </a:r>
+          </a:p>
+          <a:p>
+            <a:pPr marL="0" indent="0">
+              <a:buNone/>
+            </a:pPr>
+            <a:r>
+              <a:rPr lang="en-AU" sz="4000" b="1" dirty="0"/>
+              <a:t>CVE-2023-35708</a:t>
+            </a:r>
+          </a:p>
+          <a:p>
+            <a:pPr marL="0" indent="0">
+              <a:buNone/>
+            </a:pPr>
+            <a:r>
+              <a:rPr lang="en-AU" sz="4000" b="1" dirty="0"/>
+              <a:t>CVE-2023-36934</a:t>
+            </a:r>
+            <a:endParaRPr lang="en-US" sz="4000" b="1" dirty="0"/>
+          </a:p>
+        </p:txBody>
+      </p:sp>
     </p:spTree>
     <p:extLst>
       <p:ext uri="{BB962C8B-B14F-4D97-AF65-F5344CB8AC3E}">
@@ -11637,393 +13074,7 @@
 </p:sld>
 </file>
 
-<file path=ppt/slides/slide14.xml><?xml version="1.0" encoding="utf-8"?>
-<p:sld xmlns:a="http://schemas.openxmlformats.org/drawingml/2006/main" xmlns:r="http://schemas.openxmlformats.org/officeDocument/2006/relationships" xmlns:p="http://schemas.openxmlformats.org/presentationml/2006/main">
-  <p:cSld>
-    <p:bg>
-      <p:bgPr>
-        <a:solidFill>
-          <a:schemeClr val="bg1"/>
-        </a:solidFill>
-        <a:effectLst/>
-      </p:bgPr>
-    </p:bg>
-    <p:spTree>
-      <p:nvGrpSpPr>
-        <p:cNvPr id="1" name=""/>
-        <p:cNvGrpSpPr/>
-        <p:nvPr/>
-      </p:nvGrpSpPr>
-      <p:grpSpPr>
-        <a:xfrm>
-          <a:off x="0" y="0"/>
-          <a:ext cx="0" cy="0"/>
-          <a:chOff x="0" y="0"/>
-          <a:chExt cx="0" cy="0"/>
-        </a:xfrm>
-      </p:grpSpPr>
-      <p:sp useBgFill="1">
-        <p:nvSpPr>
-          <p:cNvPr id="25" name="Rectangle 24">
-            <a:extLst>
-              <a:ext uri="{FF2B5EF4-FFF2-40B4-BE49-F238E27FC236}">
-                <a16:creationId xmlns:a16="http://schemas.microsoft.com/office/drawing/2014/main" id="{8651CFA9-6065-4243-AC48-858E359780B1}"/>
-              </a:ext>
-              <a:ext uri="{C183D7F6-B498-43B3-948B-1728B52AA6E4}">
-                <adec:decorative xmlns:adec="http://schemas.microsoft.com/office/drawing/2017/decorative" val="1"/>
-              </a:ext>
-            </a:extLst>
-          </p:cNvPr>
-          <p:cNvSpPr>
-            <a:spLocks noGrp="1" noRot="1" noChangeAspect="1" noMove="1" noResize="1" noEditPoints="1" noAdjustHandles="1" noChangeArrowheads="1" noChangeShapeType="1" noTextEdit="1"/>
-          </p:cNvSpPr>
-          <p:nvPr>
-            <p:extLst>
-              <p:ext uri="{386F3935-93C4-4BCD-93E2-E3B085C9AB24}">
-                <p16:designElem xmlns:p16="http://schemas.microsoft.com/office/powerpoint/2015/main" val="1"/>
-              </p:ext>
-            </p:extLst>
-          </p:nvPr>
-        </p:nvSpPr>
-        <p:spPr>
-          <a:xfrm>
-            <a:off x="0" y="0"/>
-            <a:ext cx="12188952" cy="6858000"/>
-          </a:xfrm>
-          <a:prstGeom prst="rect">
-            <a:avLst/>
-          </a:prstGeom>
-          <a:ln>
-            <a:noFill/>
-          </a:ln>
-        </p:spPr>
-        <p:style>
-          <a:lnRef idx="2">
-            <a:schemeClr val="accent1">
-              <a:shade val="50000"/>
-            </a:schemeClr>
-          </a:lnRef>
-          <a:fillRef idx="1">
-            <a:schemeClr val="accent1"/>
-          </a:fillRef>
-          <a:effectRef idx="0">
-            <a:schemeClr val="accent1"/>
-          </a:effectRef>
-          <a:fontRef idx="minor">
-            <a:schemeClr val="lt1"/>
-          </a:fontRef>
-        </p:style>
-        <p:txBody>
-          <a:bodyPr rtlCol="0" anchor="ctr"/>
-          <a:lstStyle/>
-          <a:p>
-            <a:pPr algn="ctr"/>
-            <a:endParaRPr lang="en-US">
-              <a:solidFill>
-                <a:schemeClr val="tx1">
-                  <a:lumMod val="65000"/>
-                  <a:lumOff val="35000"/>
-                </a:schemeClr>
-              </a:solidFill>
-              <a:latin typeface="AvenirNext LT Pro Medium" panose="020B0504020202020204" pitchFamily="34" charset="0"/>
-            </a:endParaRPr>
-          </a:p>
-        </p:txBody>
-      </p:sp>
-      <p:sp>
-        <p:nvSpPr>
-          <p:cNvPr id="26" name="Rectangle 25">
-            <a:extLst>
-              <a:ext uri="{FF2B5EF4-FFF2-40B4-BE49-F238E27FC236}">
-                <a16:creationId xmlns:a16="http://schemas.microsoft.com/office/drawing/2014/main" id="{37962AE0-6A1C-4B76-9D52-10E5E6D7D3BB}"/>
-              </a:ext>
-              <a:ext uri="{C183D7F6-B498-43B3-948B-1728B52AA6E4}">
-                <adec:decorative xmlns:adec="http://schemas.microsoft.com/office/drawing/2017/decorative" val="1"/>
-              </a:ext>
-            </a:extLst>
-          </p:cNvPr>
-          <p:cNvSpPr>
-            <a:spLocks noGrp="1" noRot="1" noChangeAspect="1" noMove="1" noResize="1" noEditPoints="1" noAdjustHandles="1" noChangeArrowheads="1" noChangeShapeType="1" noTextEdit="1"/>
-          </p:cNvSpPr>
-          <p:nvPr>
-            <p:extLst>
-              <p:ext uri="{386F3935-93C4-4BCD-93E2-E3B085C9AB24}">
-                <p16:designElem xmlns:p16="http://schemas.microsoft.com/office/powerpoint/2015/main" val="1"/>
-              </p:ext>
-            </p:extLst>
-          </p:nvPr>
-        </p:nvSpPr>
-        <p:spPr>
-          <a:xfrm>
-            <a:off x="0" y="0"/>
-            <a:ext cx="12188952" cy="6858000"/>
-          </a:xfrm>
-          <a:prstGeom prst="rect">
-            <a:avLst/>
-          </a:prstGeom>
-          <a:solidFill>
-            <a:schemeClr val="bg2">
-              <a:alpha val="70000"/>
-            </a:schemeClr>
-          </a:solidFill>
-          <a:ln>
-            <a:noFill/>
-          </a:ln>
-        </p:spPr>
-        <p:style>
-          <a:lnRef idx="2">
-            <a:schemeClr val="accent1">
-              <a:shade val="50000"/>
-            </a:schemeClr>
-          </a:lnRef>
-          <a:fillRef idx="1">
-            <a:schemeClr val="accent1"/>
-          </a:fillRef>
-          <a:effectRef idx="0">
-            <a:schemeClr val="accent1"/>
-          </a:effectRef>
-          <a:fontRef idx="minor">
-            <a:schemeClr val="lt1"/>
-          </a:fontRef>
-        </p:style>
-        <p:txBody>
-          <a:bodyPr rtlCol="0" anchor="ctr"/>
-          <a:lstStyle/>
-          <a:p>
-            <a:pPr algn="ctr"/>
-            <a:endParaRPr lang="en-US">
-              <a:solidFill>
-                <a:schemeClr val="tx1">
-                  <a:lumMod val="65000"/>
-                  <a:lumOff val="35000"/>
-                </a:schemeClr>
-              </a:solidFill>
-              <a:latin typeface="AvenirNext LT Pro Medium" panose="020B0504020202020204" pitchFamily="34" charset="0"/>
-            </a:endParaRPr>
-          </a:p>
-        </p:txBody>
-      </p:sp>
-      <p:sp>
-        <p:nvSpPr>
-          <p:cNvPr id="27" name="Rectangle 26">
-            <a:extLst>
-              <a:ext uri="{FF2B5EF4-FFF2-40B4-BE49-F238E27FC236}">
-                <a16:creationId xmlns:a16="http://schemas.microsoft.com/office/drawing/2014/main" id="{027CAEDE-D92D-4745-8749-71019415A797}"/>
-              </a:ext>
-              <a:ext uri="{C183D7F6-B498-43B3-948B-1728B52AA6E4}">
-                <adec:decorative xmlns:adec="http://schemas.microsoft.com/office/drawing/2017/decorative" val="1"/>
-              </a:ext>
-            </a:extLst>
-          </p:cNvPr>
-          <p:cNvSpPr>
-            <a:spLocks noGrp="1" noRot="1" noChangeAspect="1" noMove="1" noResize="1" noEditPoints="1" noAdjustHandles="1" noChangeArrowheads="1" noChangeShapeType="1" noTextEdit="1"/>
-          </p:cNvSpPr>
-          <p:nvPr>
-            <p:extLst>
-              <p:ext uri="{386F3935-93C4-4BCD-93E2-E3B085C9AB24}">
-                <p16:designElem xmlns:p16="http://schemas.microsoft.com/office/powerpoint/2015/main" val="1"/>
-              </p:ext>
-            </p:extLst>
-          </p:nvPr>
-        </p:nvSpPr>
-        <p:spPr>
-          <a:xfrm>
-            <a:off x="0" y="0"/>
-            <a:ext cx="4572000" cy="6858000"/>
-          </a:xfrm>
-          <a:prstGeom prst="rect">
-            <a:avLst/>
-          </a:prstGeom>
-          <a:solidFill>
-            <a:schemeClr val="tx2">
-              <a:lumMod val="90000"/>
-              <a:lumOff val="10000"/>
-            </a:schemeClr>
-          </a:solidFill>
-          <a:ln>
-            <a:noFill/>
-          </a:ln>
-        </p:spPr>
-        <p:style>
-          <a:lnRef idx="2">
-            <a:schemeClr val="accent1">
-              <a:shade val="50000"/>
-            </a:schemeClr>
-          </a:lnRef>
-          <a:fillRef idx="1">
-            <a:schemeClr val="accent1"/>
-          </a:fillRef>
-          <a:effectRef idx="0">
-            <a:schemeClr val="accent1"/>
-          </a:effectRef>
-          <a:fontRef idx="minor">
-            <a:schemeClr val="lt1"/>
-          </a:fontRef>
-        </p:style>
-        <p:txBody>
-          <a:bodyPr rtlCol="0" anchor="ctr"/>
-          <a:lstStyle/>
-          <a:p>
-            <a:pPr algn="ctr"/>
-            <a:endParaRPr lang="en-US" dirty="0"/>
-          </a:p>
-        </p:txBody>
-      </p:sp>
-      <p:sp>
-        <p:nvSpPr>
-          <p:cNvPr id="28" name="Rectangle 27">
-            <a:extLst>
-              <a:ext uri="{FF2B5EF4-FFF2-40B4-BE49-F238E27FC236}">
-                <a16:creationId xmlns:a16="http://schemas.microsoft.com/office/drawing/2014/main" id="{00C96CB6-3880-40E6-A4BF-F64E7D1E4295}"/>
-              </a:ext>
-              <a:ext uri="{C183D7F6-B498-43B3-948B-1728B52AA6E4}">
-                <adec:decorative xmlns:adec="http://schemas.microsoft.com/office/drawing/2017/decorative" val="1"/>
-              </a:ext>
-            </a:extLst>
-          </p:cNvPr>
-          <p:cNvSpPr>
-            <a:spLocks noGrp="1" noRot="1" noChangeAspect="1" noMove="1" noResize="1" noEditPoints="1" noAdjustHandles="1" noChangeArrowheads="1" noChangeShapeType="1" noTextEdit="1"/>
-          </p:cNvSpPr>
-          <p:nvPr>
-            <p:extLst>
-              <p:ext uri="{386F3935-93C4-4BCD-93E2-E3B085C9AB24}">
-                <p16:designElem xmlns:p16="http://schemas.microsoft.com/office/powerpoint/2015/main" val="1"/>
-              </p:ext>
-            </p:extLst>
-          </p:nvPr>
-        </p:nvSpPr>
-        <p:spPr>
-          <a:xfrm>
-            <a:off x="0" y="0"/>
-            <a:ext cx="4572000" cy="6858000"/>
-          </a:xfrm>
-          <a:prstGeom prst="rect">
-            <a:avLst/>
-          </a:prstGeom>
-          <a:blipFill dpi="0" rotWithShape="1">
-            <a:blip r:embed="rId2">
-              <a:alphaModFix amt="20000"/>
-              <a:duotone>
-                <a:schemeClr val="accent1">
-                  <a:shade val="45000"/>
-                  <a:satMod val="135000"/>
-                </a:schemeClr>
-                <a:prstClr val="white"/>
-              </a:duotone>
-            </a:blip>
-            <a:srcRect/>
-            <a:tile tx="889000" ty="0" sx="100000" sy="100000" flip="none" algn="tl"/>
-          </a:blipFill>
-          <a:ln>
-            <a:noFill/>
-          </a:ln>
-        </p:spPr>
-        <p:style>
-          <a:lnRef idx="2">
-            <a:schemeClr val="accent1">
-              <a:shade val="50000"/>
-            </a:schemeClr>
-          </a:lnRef>
-          <a:fillRef idx="1">
-            <a:schemeClr val="accent1"/>
-          </a:fillRef>
-          <a:effectRef idx="0">
-            <a:schemeClr val="accent1"/>
-          </a:effectRef>
-          <a:fontRef idx="minor">
-            <a:schemeClr val="lt1"/>
-          </a:fontRef>
-        </p:style>
-        <p:txBody>
-          <a:bodyPr rtlCol="0" anchor="ctr"/>
-          <a:lstStyle/>
-          <a:p>
-            <a:pPr algn="ctr"/>
-            <a:endParaRPr lang="en-US" dirty="0"/>
-          </a:p>
-        </p:txBody>
-      </p:sp>
-      <p:sp>
-        <p:nvSpPr>
-          <p:cNvPr id="2" name="Title 1">
-            <a:extLst>
-              <a:ext uri="{FF2B5EF4-FFF2-40B4-BE49-F238E27FC236}">
-                <a16:creationId xmlns:a16="http://schemas.microsoft.com/office/drawing/2014/main" id="{BF37DF44-5B54-1AF8-C9EB-A08ADA9C40BA}"/>
-              </a:ext>
-            </a:extLst>
-          </p:cNvPr>
-          <p:cNvSpPr>
-            <a:spLocks noGrp="1"/>
-          </p:cNvSpPr>
-          <p:nvPr>
-            <p:ph type="title"/>
-          </p:nvPr>
-        </p:nvSpPr>
-        <p:spPr>
-          <a:xfrm>
-            <a:off x="838201" y="559813"/>
-            <a:ext cx="2819399" cy="5577934"/>
-          </a:xfrm>
-        </p:spPr>
-        <p:txBody>
-          <a:bodyPr>
-            <a:normAutofit/>
-          </a:bodyPr>
-          <a:lstStyle/>
-          <a:p>
-            <a:r>
-              <a:rPr lang="en-US" sz="3400"/>
-              <a:t>Likelihood of CVE exploitation by TA505</a:t>
-            </a:r>
-            <a:endParaRPr lang="en-AU" sz="3400"/>
-          </a:p>
-        </p:txBody>
-      </p:sp>
-      <p:graphicFrame>
-        <p:nvGraphicFramePr>
-          <p:cNvPr id="29" name="Content Placeholder 2">
-            <a:extLst>
-              <a:ext uri="{FF2B5EF4-FFF2-40B4-BE49-F238E27FC236}">
-                <a16:creationId xmlns:a16="http://schemas.microsoft.com/office/drawing/2014/main" id="{AF8424D4-9545-EC29-CED9-9C575DF7A055}"/>
-              </a:ext>
-            </a:extLst>
-          </p:cNvPr>
-          <p:cNvGraphicFramePr>
-            <a:graphicFrameLocks noGrp="1"/>
-          </p:cNvGraphicFramePr>
-          <p:nvPr>
-            <p:ph idx="1"/>
-            <p:extLst>
-              <p:ext uri="{D42A27DB-BD31-4B8C-83A1-F6EECF244321}">
-                <p14:modId xmlns:p14="http://schemas.microsoft.com/office/powerpoint/2010/main" val="369402850"/>
-              </p:ext>
-            </p:extLst>
-          </p:nvPr>
-        </p:nvGraphicFramePr>
-        <p:xfrm>
-          <a:off x="4807223" y="457200"/>
-          <a:ext cx="7003777" cy="5843605"/>
-        </p:xfrm>
-        <a:graphic>
-          <a:graphicData uri="http://schemas.openxmlformats.org/drawingml/2006/diagram">
-            <dgm:relIds xmlns:dgm="http://schemas.openxmlformats.org/drawingml/2006/diagram" xmlns:r="http://schemas.openxmlformats.org/officeDocument/2006/relationships" r:dm="rId3" r:lo="rId4" r:qs="rId5" r:cs="rId6"/>
-          </a:graphicData>
-        </a:graphic>
-      </p:graphicFrame>
-    </p:spTree>
-    <p:extLst>
-      <p:ext uri="{BB962C8B-B14F-4D97-AF65-F5344CB8AC3E}">
-        <p14:creationId xmlns:p14="http://schemas.microsoft.com/office/powerpoint/2010/main" val="2679302679"/>
-      </p:ext>
-    </p:extLst>
-  </p:cSld>
-  <p:clrMapOvr>
-    <a:masterClrMapping/>
-  </p:clrMapOvr>
-</p:sld>
-</file>
-
-<file path=ppt/slides/slide15.xml><?xml version="1.0" encoding="utf-8"?>
+<file path=ppt/slides/slide16.xml><?xml version="1.0" encoding="utf-8"?>
 <p:sld xmlns:a="http://schemas.openxmlformats.org/drawingml/2006/main" xmlns:r="http://schemas.openxmlformats.org/officeDocument/2006/relationships" xmlns:p="http://schemas.openxmlformats.org/presentationml/2006/main">
   <p:cSld>
     <p:bg>
@@ -12502,7 +13553,7 @@
 </p:sld>
 </file>
 
-<file path=ppt/slides/slide16.xml><?xml version="1.0" encoding="utf-8"?>
+<file path=ppt/slides/slide17.xml><?xml version="1.0" encoding="utf-8"?>
 <p:sld xmlns:a="http://schemas.openxmlformats.org/drawingml/2006/main" xmlns:r="http://schemas.openxmlformats.org/officeDocument/2006/relationships" xmlns:p="http://schemas.openxmlformats.org/presentationml/2006/main">
   <p:cSld>
     <p:spTree>
@@ -12668,7 +13719,7 @@
 </p:sld>
 </file>
 
-<file path=ppt/slides/slide17.xml><?xml version="1.0" encoding="utf-8"?>
+<file path=ppt/slides/slide18.xml><?xml version="1.0" encoding="utf-8"?>
 <p:sld xmlns:a="http://schemas.openxmlformats.org/drawingml/2006/main" xmlns:r="http://schemas.openxmlformats.org/officeDocument/2006/relationships" xmlns:p="http://schemas.openxmlformats.org/presentationml/2006/main">
   <p:cSld>
     <p:bg>
@@ -13196,7 +14247,7 @@
 </p:sld>
 </file>
 
-<file path=ppt/slides/slide18.xml><?xml version="1.0" encoding="utf-8"?>
+<file path=ppt/slides/slide19.xml><?xml version="1.0" encoding="utf-8"?>
 <p:sld xmlns:a="http://schemas.openxmlformats.org/drawingml/2006/main" xmlns:r="http://schemas.openxmlformats.org/officeDocument/2006/relationships" xmlns:p="http://schemas.openxmlformats.org/presentationml/2006/main">
   <p:cSld>
     <p:bg>
@@ -13642,116 +14693,6 @@
 </p:sld>
 </file>
 
-<file path=ppt/slides/slide19.xml><?xml version="1.0" encoding="utf-8"?>
-<p:sld xmlns:a="http://schemas.openxmlformats.org/drawingml/2006/main" xmlns:r="http://schemas.openxmlformats.org/officeDocument/2006/relationships" xmlns:p="http://schemas.openxmlformats.org/presentationml/2006/main">
-  <p:cSld>
-    <p:spTree>
-      <p:nvGrpSpPr>
-        <p:cNvPr id="1" name=""/>
-        <p:cNvGrpSpPr/>
-        <p:nvPr/>
-      </p:nvGrpSpPr>
-      <p:grpSpPr>
-        <a:xfrm>
-          <a:off x="0" y="0"/>
-          <a:ext cx="0" cy="0"/>
-          <a:chOff x="0" y="0"/>
-          <a:chExt cx="0" cy="0"/>
-        </a:xfrm>
-      </p:grpSpPr>
-      <p:sp>
-        <p:nvSpPr>
-          <p:cNvPr id="2" name="Title 1">
-            <a:extLst>
-              <a:ext uri="{FF2B5EF4-FFF2-40B4-BE49-F238E27FC236}">
-                <a16:creationId xmlns:a16="http://schemas.microsoft.com/office/drawing/2014/main" id="{41A2C8EB-B148-B1F4-3657-6DD63F112759}"/>
-              </a:ext>
-            </a:extLst>
-          </p:cNvPr>
-          <p:cNvSpPr>
-            <a:spLocks noGrp="1"/>
-          </p:cNvSpPr>
-          <p:nvPr>
-            <p:ph type="title"/>
-          </p:nvPr>
-        </p:nvSpPr>
-        <p:spPr/>
-        <p:txBody>
-          <a:bodyPr>
-            <a:normAutofit fontScale="90000"/>
-          </a:bodyPr>
-          <a:lstStyle/>
-          <a:p>
-            <a:r>
-              <a:rPr lang="en-AU" sz="4400" b="1" kern="100" dirty="0">
-                <a:effectLst/>
-                <a:latin typeface="Aptos" panose="020B0004020202020204" pitchFamily="34" charset="0"/>
-                <a:ea typeface="Aptos" panose="020B0004020202020204" pitchFamily="34" charset="0"/>
-                <a:cs typeface="Arial" panose="020B0604020202020204" pitchFamily="34" charset="0"/>
-              </a:rPr>
-              <a:t>Technique 2: T1486</a:t>
-            </a:r>
-            <a:br>
-              <a:rPr lang="en-AU" sz="4400" kern="100" dirty="0">
-                <a:effectLst/>
-                <a:latin typeface="Aptos" panose="020B0004020202020204" pitchFamily="34" charset="0"/>
-                <a:ea typeface="Aptos" panose="020B0004020202020204" pitchFamily="34" charset="0"/>
-                <a:cs typeface="Arial" panose="020B0604020202020204" pitchFamily="34" charset="0"/>
-              </a:rPr>
-            </a:br>
-            <a:endParaRPr lang="en-AU" dirty="0"/>
-          </a:p>
-        </p:txBody>
-      </p:sp>
-      <p:sp>
-        <p:nvSpPr>
-          <p:cNvPr id="3" name="Content Placeholder 2">
-            <a:extLst>
-              <a:ext uri="{FF2B5EF4-FFF2-40B4-BE49-F238E27FC236}">
-                <a16:creationId xmlns:a16="http://schemas.microsoft.com/office/drawing/2014/main" id="{ED58547F-8A6C-73CC-2DB8-F0AA5E410A6C}"/>
-              </a:ext>
-            </a:extLst>
-          </p:cNvPr>
-          <p:cNvSpPr>
-            <a:spLocks noGrp="1"/>
-          </p:cNvSpPr>
-          <p:nvPr>
-            <p:ph idx="1"/>
-          </p:nvPr>
-        </p:nvSpPr>
-        <p:spPr/>
-        <p:txBody>
-          <a:bodyPr>
-            <a:normAutofit/>
-          </a:bodyPr>
-          <a:lstStyle/>
-          <a:p>
-            <a:r>
-              <a:rPr lang="en-AU" sz="3200" dirty="0">
-                <a:effectLst/>
-                <a:latin typeface="Aptos" panose="020B0004020202020204" pitchFamily="34" charset="0"/>
-                <a:ea typeface="Aptos" panose="020B0004020202020204" pitchFamily="34" charset="0"/>
-                <a:cs typeface="Arial" panose="020B0604020202020204" pitchFamily="34" charset="0"/>
-              </a:rPr>
-              <a:t>Emulating how cl0p can encrypt files using AES, RSA, and RC4 and will add the ".clop" extension to encrypted files. </a:t>
-            </a:r>
-            <a:endParaRPr lang="en-AU" sz="6600" dirty="0"/>
-          </a:p>
-        </p:txBody>
-      </p:sp>
-    </p:spTree>
-    <p:extLst>
-      <p:ext uri="{BB962C8B-B14F-4D97-AF65-F5344CB8AC3E}">
-        <p14:creationId xmlns:p14="http://schemas.microsoft.com/office/powerpoint/2010/main" val="2711611543"/>
-      </p:ext>
-    </p:extLst>
-  </p:cSld>
-  <p:clrMapOvr>
-    <a:masterClrMapping/>
-  </p:clrMapOvr>
-</p:sld>
-</file>
-
 <file path=ppt/slides/slide2.xml><?xml version="1.0" encoding="utf-8"?>
 <p:sld xmlns:a="http://schemas.openxmlformats.org/drawingml/2006/main" xmlns:r="http://schemas.openxmlformats.org/officeDocument/2006/relationships" xmlns:p="http://schemas.openxmlformats.org/presentationml/2006/main">
   <p:cSld>
@@ -13879,6 +14820,116 @@
 </file>
 
 <file path=ppt/slides/slide20.xml><?xml version="1.0" encoding="utf-8"?>
+<p:sld xmlns:a="http://schemas.openxmlformats.org/drawingml/2006/main" xmlns:r="http://schemas.openxmlformats.org/officeDocument/2006/relationships" xmlns:p="http://schemas.openxmlformats.org/presentationml/2006/main">
+  <p:cSld>
+    <p:spTree>
+      <p:nvGrpSpPr>
+        <p:cNvPr id="1" name=""/>
+        <p:cNvGrpSpPr/>
+        <p:nvPr/>
+      </p:nvGrpSpPr>
+      <p:grpSpPr>
+        <a:xfrm>
+          <a:off x="0" y="0"/>
+          <a:ext cx="0" cy="0"/>
+          <a:chOff x="0" y="0"/>
+          <a:chExt cx="0" cy="0"/>
+        </a:xfrm>
+      </p:grpSpPr>
+      <p:sp>
+        <p:nvSpPr>
+          <p:cNvPr id="2" name="Title 1">
+            <a:extLst>
+              <a:ext uri="{FF2B5EF4-FFF2-40B4-BE49-F238E27FC236}">
+                <a16:creationId xmlns:a16="http://schemas.microsoft.com/office/drawing/2014/main" id="{41A2C8EB-B148-B1F4-3657-6DD63F112759}"/>
+              </a:ext>
+            </a:extLst>
+          </p:cNvPr>
+          <p:cNvSpPr>
+            <a:spLocks noGrp="1"/>
+          </p:cNvSpPr>
+          <p:nvPr>
+            <p:ph type="title"/>
+          </p:nvPr>
+        </p:nvSpPr>
+        <p:spPr/>
+        <p:txBody>
+          <a:bodyPr>
+            <a:normAutofit fontScale="90000"/>
+          </a:bodyPr>
+          <a:lstStyle/>
+          <a:p>
+            <a:r>
+              <a:rPr lang="en-AU" sz="4400" b="1" kern="100" dirty="0">
+                <a:effectLst/>
+                <a:latin typeface="Aptos" panose="020B0004020202020204" pitchFamily="34" charset="0"/>
+                <a:ea typeface="Aptos" panose="020B0004020202020204" pitchFamily="34" charset="0"/>
+                <a:cs typeface="Arial" panose="020B0604020202020204" pitchFamily="34" charset="0"/>
+              </a:rPr>
+              <a:t>Technique 2: T1486</a:t>
+            </a:r>
+            <a:br>
+              <a:rPr lang="en-AU" sz="4400" kern="100" dirty="0">
+                <a:effectLst/>
+                <a:latin typeface="Aptos" panose="020B0004020202020204" pitchFamily="34" charset="0"/>
+                <a:ea typeface="Aptos" panose="020B0004020202020204" pitchFamily="34" charset="0"/>
+                <a:cs typeface="Arial" panose="020B0604020202020204" pitchFamily="34" charset="0"/>
+              </a:rPr>
+            </a:br>
+            <a:endParaRPr lang="en-AU" dirty="0"/>
+          </a:p>
+        </p:txBody>
+      </p:sp>
+      <p:sp>
+        <p:nvSpPr>
+          <p:cNvPr id="3" name="Content Placeholder 2">
+            <a:extLst>
+              <a:ext uri="{FF2B5EF4-FFF2-40B4-BE49-F238E27FC236}">
+                <a16:creationId xmlns:a16="http://schemas.microsoft.com/office/drawing/2014/main" id="{ED58547F-8A6C-73CC-2DB8-F0AA5E410A6C}"/>
+              </a:ext>
+            </a:extLst>
+          </p:cNvPr>
+          <p:cNvSpPr>
+            <a:spLocks noGrp="1"/>
+          </p:cNvSpPr>
+          <p:nvPr>
+            <p:ph idx="1"/>
+          </p:nvPr>
+        </p:nvSpPr>
+        <p:spPr/>
+        <p:txBody>
+          <a:bodyPr>
+            <a:normAutofit/>
+          </a:bodyPr>
+          <a:lstStyle/>
+          <a:p>
+            <a:r>
+              <a:rPr lang="en-AU" sz="3200" dirty="0">
+                <a:effectLst/>
+                <a:latin typeface="Aptos" panose="020B0004020202020204" pitchFamily="34" charset="0"/>
+                <a:ea typeface="Aptos" panose="020B0004020202020204" pitchFamily="34" charset="0"/>
+                <a:cs typeface="Arial" panose="020B0604020202020204" pitchFamily="34" charset="0"/>
+              </a:rPr>
+              <a:t>Emulating how cl0p can encrypt files using AES, RSA, and RC4 and will add the ".clop" extension to encrypted files. </a:t>
+            </a:r>
+            <a:endParaRPr lang="en-AU" sz="6600" dirty="0"/>
+          </a:p>
+        </p:txBody>
+      </p:sp>
+    </p:spTree>
+    <p:extLst>
+      <p:ext uri="{BB962C8B-B14F-4D97-AF65-F5344CB8AC3E}">
+        <p14:creationId xmlns:p14="http://schemas.microsoft.com/office/powerpoint/2010/main" val="2711611543"/>
+      </p:ext>
+    </p:extLst>
+  </p:cSld>
+  <p:clrMapOvr>
+    <a:masterClrMapping/>
+  </p:clrMapOvr>
+</p:sld>
+</file>
+
+<file path=ppt/slides/slide21.xml><?xml version="1.0" encoding="utf-8"?>
 <p:sld xmlns:a="http://schemas.openxmlformats.org/drawingml/2006/main" xmlns:r="http://schemas.openxmlformats.org/officeDocument/2006/relationships" xmlns:p="http://schemas.openxmlformats.org/presentationml/2006/main">
   <p:cSld>
     <p:bg>
@@ -14359,7 +15410,7 @@
 </p:sld>
 </file>
 
-<file path=ppt/slides/slide21.xml><?xml version="1.0" encoding="utf-8"?>
+<file path=ppt/slides/slide22.xml><?xml version="1.0" encoding="utf-8"?>
 <p:sld xmlns:a="http://schemas.openxmlformats.org/drawingml/2006/main" xmlns:r="http://schemas.openxmlformats.org/officeDocument/2006/relationships" xmlns:p="http://schemas.openxmlformats.org/presentationml/2006/main">
   <p:cSld>
     <p:bg>
@@ -14861,93 +15912,6 @@
 </p:sld>
 </file>
 
-<file path=ppt/slides/slide22.xml><?xml version="1.0" encoding="utf-8"?>
-<p:sld xmlns:a="http://schemas.openxmlformats.org/drawingml/2006/main" xmlns:r="http://schemas.openxmlformats.org/officeDocument/2006/relationships" xmlns:p="http://schemas.openxmlformats.org/presentationml/2006/main">
-  <p:cSld>
-    <p:spTree>
-      <p:nvGrpSpPr>
-        <p:cNvPr id="1" name=""/>
-        <p:cNvGrpSpPr/>
-        <p:nvPr/>
-      </p:nvGrpSpPr>
-      <p:grpSpPr>
-        <a:xfrm>
-          <a:off x="0" y="0"/>
-          <a:ext cx="0" cy="0"/>
-          <a:chOff x="0" y="0"/>
-          <a:chExt cx="0" cy="0"/>
-        </a:xfrm>
-      </p:grpSpPr>
-      <p:sp>
-        <p:nvSpPr>
-          <p:cNvPr id="2" name="Title 1">
-            <a:extLst>
-              <a:ext uri="{FF2B5EF4-FFF2-40B4-BE49-F238E27FC236}">
-                <a16:creationId xmlns:a16="http://schemas.microsoft.com/office/drawing/2014/main" id="{EB52E585-E880-348B-A911-0868E2ADA77F}"/>
-              </a:ext>
-            </a:extLst>
-          </p:cNvPr>
-          <p:cNvSpPr>
-            <a:spLocks noGrp="1"/>
-          </p:cNvSpPr>
-          <p:nvPr>
-            <p:ph type="title"/>
-          </p:nvPr>
-        </p:nvSpPr>
-        <p:spPr/>
-        <p:txBody>
-          <a:bodyPr/>
-          <a:lstStyle/>
-          <a:p>
-            <a:r>
-              <a:rPr lang="en-AU" dirty="0" err="1"/>
-              <a:t>Github</a:t>
-            </a:r>
-            <a:r>
-              <a:rPr lang="en-AU" dirty="0"/>
-              <a:t> Link</a:t>
-            </a:r>
-          </a:p>
-        </p:txBody>
-      </p:sp>
-      <p:sp>
-        <p:nvSpPr>
-          <p:cNvPr id="3" name="Content Placeholder 2">
-            <a:extLst>
-              <a:ext uri="{FF2B5EF4-FFF2-40B4-BE49-F238E27FC236}">
-                <a16:creationId xmlns:a16="http://schemas.microsoft.com/office/drawing/2014/main" id="{47AD6304-6EE4-C018-BDE9-B77CF89EB551}"/>
-              </a:ext>
-            </a:extLst>
-          </p:cNvPr>
-          <p:cNvSpPr>
-            <a:spLocks noGrp="1"/>
-          </p:cNvSpPr>
-          <p:nvPr>
-            <p:ph idx="1"/>
-          </p:nvPr>
-        </p:nvSpPr>
-        <p:spPr/>
-        <p:txBody>
-          <a:bodyPr/>
-          <a:lstStyle/>
-          <a:p>
-            <a:endParaRPr lang="en-AU"/>
-          </a:p>
-        </p:txBody>
-      </p:sp>
-    </p:spTree>
-    <p:extLst>
-      <p:ext uri="{BB962C8B-B14F-4D97-AF65-F5344CB8AC3E}">
-        <p14:creationId xmlns:p14="http://schemas.microsoft.com/office/powerpoint/2010/main" val="102733115"/>
-      </p:ext>
-    </p:extLst>
-  </p:cSld>
-  <p:clrMapOvr>
-    <a:masterClrMapping/>
-  </p:clrMapOvr>
-</p:sld>
-</file>
-
 <file path=ppt/slides/slide23.xml><?xml version="1.0" encoding="utf-8"?>
 <p:sld xmlns:a="http://schemas.openxmlformats.org/drawingml/2006/main" xmlns:r="http://schemas.openxmlformats.org/officeDocument/2006/relationships" xmlns:p="http://schemas.openxmlformats.org/presentationml/2006/main">
   <p:cSld>
@@ -14970,6 +15934,102 @@
           <p:cNvPr id="2" name="Title 1">
             <a:extLst>
               <a:ext uri="{FF2B5EF4-FFF2-40B4-BE49-F238E27FC236}">
+                <a16:creationId xmlns:a16="http://schemas.microsoft.com/office/drawing/2014/main" id="{EB52E585-E880-348B-A911-0868E2ADA77F}"/>
+              </a:ext>
+            </a:extLst>
+          </p:cNvPr>
+          <p:cNvSpPr>
+            <a:spLocks noGrp="1"/>
+          </p:cNvSpPr>
+          <p:nvPr>
+            <p:ph type="title"/>
+          </p:nvPr>
+        </p:nvSpPr>
+        <p:spPr/>
+        <p:txBody>
+          <a:bodyPr/>
+          <a:lstStyle/>
+          <a:p>
+            <a:r>
+              <a:rPr lang="en-AU" dirty="0" err="1"/>
+              <a:t>Github</a:t>
+            </a:r>
+            <a:r>
+              <a:rPr lang="en-AU" dirty="0"/>
+              <a:t> Link</a:t>
+            </a:r>
+          </a:p>
+        </p:txBody>
+      </p:sp>
+      <p:sp>
+        <p:nvSpPr>
+          <p:cNvPr id="3" name="Content Placeholder 2">
+            <a:extLst>
+              <a:ext uri="{FF2B5EF4-FFF2-40B4-BE49-F238E27FC236}">
+                <a16:creationId xmlns:a16="http://schemas.microsoft.com/office/drawing/2014/main" id="{47AD6304-6EE4-C018-BDE9-B77CF89EB551}"/>
+              </a:ext>
+            </a:extLst>
+          </p:cNvPr>
+          <p:cNvSpPr>
+            <a:spLocks noGrp="1"/>
+          </p:cNvSpPr>
+          <p:nvPr>
+            <p:ph idx="1"/>
+          </p:nvPr>
+        </p:nvSpPr>
+        <p:spPr/>
+        <p:txBody>
+          <a:bodyPr/>
+          <a:lstStyle/>
+          <a:p>
+            <a:pPr marL="0" indent="0">
+              <a:buNone/>
+            </a:pPr>
+            <a:r>
+              <a:rPr lang="en-AU" dirty="0">
+                <a:hlinkClick r:id="rId2"/>
+              </a:rPr>
+              <a:t>https://github.com/IceFire4/Assignment_1_Daniel_Edwards_Matthew_Haydon</a:t>
+            </a:r>
+            <a:endParaRPr lang="en-AU" dirty="0"/>
+          </a:p>
+        </p:txBody>
+      </p:sp>
+    </p:spTree>
+    <p:extLst>
+      <p:ext uri="{BB962C8B-B14F-4D97-AF65-F5344CB8AC3E}">
+        <p14:creationId xmlns:p14="http://schemas.microsoft.com/office/powerpoint/2010/main" val="102733115"/>
+      </p:ext>
+    </p:extLst>
+  </p:cSld>
+  <p:clrMapOvr>
+    <a:masterClrMapping/>
+  </p:clrMapOvr>
+</p:sld>
+</file>
+
+<file path=ppt/slides/slide24.xml><?xml version="1.0" encoding="utf-8"?>
+<p:sld xmlns:a="http://schemas.openxmlformats.org/drawingml/2006/main" xmlns:r="http://schemas.openxmlformats.org/officeDocument/2006/relationships" xmlns:p="http://schemas.openxmlformats.org/presentationml/2006/main">
+  <p:cSld>
+    <p:spTree>
+      <p:nvGrpSpPr>
+        <p:cNvPr id="1" name=""/>
+        <p:cNvGrpSpPr/>
+        <p:nvPr/>
+      </p:nvGrpSpPr>
+      <p:grpSpPr>
+        <a:xfrm>
+          <a:off x="0" y="0"/>
+          <a:ext cx="0" cy="0"/>
+          <a:chOff x="0" y="0"/>
+          <a:chExt cx="0" cy="0"/>
+        </a:xfrm>
+      </p:grpSpPr>
+      <p:sp>
+        <p:nvSpPr>
+          <p:cNvPr id="2" name="Title 1">
+            <a:extLst>
+              <a:ext uri="{FF2B5EF4-FFF2-40B4-BE49-F238E27FC236}">
                 <a16:creationId xmlns:a16="http://schemas.microsoft.com/office/drawing/2014/main" id="{158FAAA3-93F9-F14D-6CA0-9DC22F2AC2B8}"/>
               </a:ext>
             </a:extLst>
@@ -15031,9 +16091,6 @@
               </a:rPr>
               <a:t>https://www.cybereason.com/blog/research/cybereason-vs.-clop-ransomware</a:t>
             </a:r>
-            <a:endParaRPr lang="en-AU" dirty="0"/>
-          </a:p>
-          <a:p>
             <a:endParaRPr lang="en-AU" dirty="0"/>
           </a:p>
           <a:p>
@@ -15058,6 +16115,45 @@
             <a:endParaRPr lang="en-AU" dirty="0"/>
           </a:p>
           <a:p>
+            <a:r>
+              <a:rPr lang="en-US" dirty="0"/>
+              <a:t>MITRE 2023, </a:t>
+            </a:r>
+            <a:r>
+              <a:rPr lang="en-US" i="1" dirty="0"/>
+              <a:t>APT39</a:t>
+            </a:r>
+            <a:r>
+              <a:rPr lang="en-US" dirty="0"/>
+              <a:t>, viewed 17 September 2024, </a:t>
+            </a:r>
+            <a:r>
+              <a:rPr lang="en-US" dirty="0">
+                <a:hlinkClick r:id="rId4"/>
+              </a:rPr>
+              <a:t>https://attack.mitre.org/groups/G0092/</a:t>
+            </a:r>
+            <a:endParaRPr lang="en-AU" dirty="0"/>
+          </a:p>
+          <a:p>
+            <a:r>
+              <a:rPr lang="en-US" dirty="0"/>
+              <a:t>MITRE 2023, </a:t>
+            </a:r>
+            <a:r>
+              <a:rPr lang="en-US" i="1" dirty="0"/>
+              <a:t>Clop</a:t>
+            </a:r>
+            <a:r>
+              <a:rPr lang="en-US" dirty="0"/>
+              <a:t>, viewed 17 September 2024, </a:t>
+            </a:r>
+            <a:r>
+              <a:rPr lang="en-US" dirty="0">
+                <a:hlinkClick r:id="rId5"/>
+              </a:rPr>
+              <a:t>https://attack.mitre.org/software/S0611/</a:t>
+            </a:r>
             <a:endParaRPr lang="en-AU" dirty="0"/>
           </a:p>
           <a:p>
@@ -15067,33 +16163,17 @@
             </a:r>
             <a:r>
               <a:rPr lang="en-AU" dirty="0">
-                <a:hlinkClick r:id="rId4"/>
+                <a:hlinkClick r:id="rId6"/>
               </a:rPr>
               <a:t>https://nvd.nist.gov/vuln/detail/CVE-2023-34362</a:t>
             </a:r>
             <a:endParaRPr lang="en-AU" dirty="0"/>
           </a:p>
           <a:p>
-            <a:endParaRPr lang="en-AU" dirty="0"/>
-          </a:p>
-          <a:p>
             <a:r>
               <a:rPr lang="en-AU" dirty="0"/>
-              <a:t>Red Canary Co. 2024, Atomic red team t1486: data encrypted for impact, viewed 17 September 2024, </a:t>
+              <a:t>Red Canary Co. 2024, Atomic red team t1486: data encrypted for impact, viewed 17 September 2024, https://github.com/redcanaryco/atomic-red team/blob/master/atomics/T1486/T1486.md</a:t>
             </a:r>
-            <a:r>
-              <a:rPr lang="en-AU" dirty="0">
-                <a:hlinkClick r:id="rId5"/>
-              </a:rPr>
-              <a:t>https://github.com/redcanaryco/atomic-red team/blob/master/atomics/T1486/T1486.md</a:t>
-            </a:r>
-            <a:endParaRPr lang="en-AU" dirty="0"/>
-          </a:p>
-          <a:p>
-            <a:pPr marL="0" indent="0">
-              <a:buNone/>
-            </a:pPr>
-            <a:endParaRPr lang="en-AU" dirty="0"/>
           </a:p>
           <a:p>
             <a:r>
@@ -15102,7 +16182,7 @@
             </a:r>
             <a:r>
               <a:rPr lang="en-AU" dirty="0">
-                <a:hlinkClick r:id="rId6"/>
+                <a:hlinkClick r:id="rId7"/>
               </a:rPr>
               <a:t>https://github.com/redcanaryco/atomic-red-team/blob/master/atomics/T1614.001/T1614.001.md</a:t>
             </a:r>

</xml_diff>